<commit_message>
added tags to wireframe
</commit_message>
<xml_diff>
--- a/personal website wireframe.pptx
+++ b/personal website wireframe.pptx
@@ -803,7 +803,7 @@
   <p:cSld>
     <p:spTree>
       <p:nvGrpSpPr>
-        <p:cNvPr id="138" name="Shape 138"/>
+        <p:cNvPr id="155" name="Shape 155"/>
         <p:cNvGrpSpPr/>
         <p:nvPr/>
       </p:nvGrpSpPr>
@@ -817,7 +817,7 @@
       </p:grpSpPr>
       <p:sp>
         <p:nvSpPr>
-          <p:cNvPr id="139" name="Google Shape;139;gc8fa2977bd_0_50:notes"/>
+          <p:cNvPr id="156" name="Google Shape;156;gc8fa2977bd_0_50:notes"/>
           <p:cNvSpPr/>
           <p:nvPr>
             <p:ph idx="2" type="sldImg"/>
@@ -852,7 +852,7 @@
       </p:sp>
       <p:sp>
         <p:nvSpPr>
-          <p:cNvPr id="140" name="Google Shape;140;gc8fa2977bd_0_50:notes"/>
+          <p:cNvPr id="157" name="Google Shape;157;gc8fa2977bd_0_50:notes"/>
           <p:cNvSpPr txBox="1"/>
           <p:nvPr>
             <p:ph idx="1" type="body"/>
@@ -9705,7 +9705,7 @@
               </a:rPr>
               <a:t>TAGS</a:t>
             </a:r>
-            <a:endParaRPr b="1" sz="1100" u="sng">
+            <a:endParaRPr b="1" sz="1200" u="sng">
               <a:solidFill>
                 <a:srgbClr val="FA7815"/>
               </a:solidFill>
@@ -9726,7 +9726,16 @@
               <a:buNone/>
             </a:pPr>
             <a:r>
-              <a:t/>
+              <a:rPr b="1" lang="en" sz="1200">
+                <a:solidFill>
+                  <a:srgbClr val="FA7815"/>
+                </a:solidFill>
+                <a:latin typeface="Roboto Mono"/>
+                <a:ea typeface="Roboto Mono"/>
+                <a:cs typeface="Roboto Mono"/>
+                <a:sym typeface="Roboto Mono"/>
+              </a:rPr>
+              <a:t>On click of image/title of interest, &lt;p&gt; pops up with information on interest.</a:t>
             </a:r>
             <a:endParaRPr b="1" sz="1200">
               <a:solidFill>
@@ -10862,6 +10871,992 @@
           </a:p>
         </p:txBody>
       </p:sp>
+      <p:sp>
+        <p:nvSpPr>
+          <p:cNvPr id="138" name="Google Shape;138;p18"/>
+          <p:cNvSpPr txBox="1"/>
+          <p:nvPr/>
+        </p:nvSpPr>
+        <p:spPr>
+          <a:xfrm>
+            <a:off x="8098700" y="3026700"/>
+            <a:ext cx="618600" cy="305400"/>
+          </a:xfrm>
+          <a:prstGeom prst="rect">
+            <a:avLst/>
+          </a:prstGeom>
+          <a:noFill/>
+          <a:ln>
+            <a:noFill/>
+          </a:ln>
+        </p:spPr>
+        <p:txBody>
+          <a:bodyPr anchorCtr="0" anchor="t" bIns="91425" lIns="91425" spcFirstLastPara="1" rIns="91425" wrap="square" tIns="91425">
+            <a:noAutofit/>
+          </a:bodyPr>
+          <a:lstStyle/>
+          <a:p>
+            <a:pPr indent="0" lvl="0" marL="0" rtl="0" algn="l">
+              <a:spcBef>
+                <a:spcPts val="0"/>
+              </a:spcBef>
+              <a:spcAft>
+                <a:spcPts val="0"/>
+              </a:spcAft>
+              <a:buNone/>
+            </a:pPr>
+            <a:r>
+              <a:rPr lang="en" sz="1000">
+                <a:solidFill>
+                  <a:srgbClr val="FA7815"/>
+                </a:solidFill>
+                <a:latin typeface="Roboto"/>
+                <a:ea typeface="Roboto"/>
+                <a:cs typeface="Roboto"/>
+                <a:sym typeface="Roboto"/>
+              </a:rPr>
+              <a:t>&lt;main&gt;</a:t>
+            </a:r>
+            <a:endParaRPr sz="1000">
+              <a:solidFill>
+                <a:srgbClr val="FA7815"/>
+              </a:solidFill>
+              <a:latin typeface="Roboto"/>
+              <a:ea typeface="Roboto"/>
+              <a:cs typeface="Roboto"/>
+              <a:sym typeface="Roboto"/>
+            </a:endParaRPr>
+          </a:p>
+        </p:txBody>
+      </p:sp>
+      <p:sp>
+        <p:nvSpPr>
+          <p:cNvPr id="139" name="Google Shape;139;p18"/>
+          <p:cNvSpPr txBox="1"/>
+          <p:nvPr/>
+        </p:nvSpPr>
+        <p:spPr>
+          <a:xfrm>
+            <a:off x="6598925" y="1327400"/>
+            <a:ext cx="731400" cy="305400"/>
+          </a:xfrm>
+          <a:prstGeom prst="rect">
+            <a:avLst/>
+          </a:prstGeom>
+          <a:noFill/>
+          <a:ln>
+            <a:noFill/>
+          </a:ln>
+        </p:spPr>
+        <p:txBody>
+          <a:bodyPr anchorCtr="0" anchor="t" bIns="91425" lIns="91425" spcFirstLastPara="1" rIns="91425" wrap="square" tIns="91425">
+            <a:noAutofit/>
+          </a:bodyPr>
+          <a:lstStyle/>
+          <a:p>
+            <a:pPr indent="0" lvl="0" marL="0" rtl="0" algn="l">
+              <a:spcBef>
+                <a:spcPts val="0"/>
+              </a:spcBef>
+              <a:spcAft>
+                <a:spcPts val="0"/>
+              </a:spcAft>
+              <a:buNone/>
+            </a:pPr>
+            <a:r>
+              <a:rPr lang="en" sz="1000">
+                <a:solidFill>
+                  <a:srgbClr val="FA7815"/>
+                </a:solidFill>
+                <a:latin typeface="Roboto"/>
+                <a:ea typeface="Roboto"/>
+                <a:cs typeface="Roboto"/>
+                <a:sym typeface="Roboto"/>
+              </a:rPr>
+              <a:t>&lt;header&gt;</a:t>
+            </a:r>
+            <a:endParaRPr sz="1000">
+              <a:solidFill>
+                <a:srgbClr val="FA7815"/>
+              </a:solidFill>
+              <a:latin typeface="Roboto"/>
+              <a:ea typeface="Roboto"/>
+              <a:cs typeface="Roboto"/>
+              <a:sym typeface="Roboto"/>
+            </a:endParaRPr>
+          </a:p>
+        </p:txBody>
+      </p:sp>
+      <p:sp>
+        <p:nvSpPr>
+          <p:cNvPr id="140" name="Google Shape;140;p18"/>
+          <p:cNvSpPr txBox="1"/>
+          <p:nvPr/>
+        </p:nvSpPr>
+        <p:spPr>
+          <a:xfrm>
+            <a:off x="4655950" y="977475"/>
+            <a:ext cx="526500" cy="305400"/>
+          </a:xfrm>
+          <a:prstGeom prst="rect">
+            <a:avLst/>
+          </a:prstGeom>
+          <a:noFill/>
+          <a:ln>
+            <a:noFill/>
+          </a:ln>
+        </p:spPr>
+        <p:txBody>
+          <a:bodyPr anchorCtr="0" anchor="t" bIns="91425" lIns="91425" spcFirstLastPara="1" rIns="91425" wrap="square" tIns="91425">
+            <a:noAutofit/>
+          </a:bodyPr>
+          <a:lstStyle/>
+          <a:p>
+            <a:pPr indent="0" lvl="0" marL="0" rtl="0" algn="l">
+              <a:spcBef>
+                <a:spcPts val="0"/>
+              </a:spcBef>
+              <a:spcAft>
+                <a:spcPts val="0"/>
+              </a:spcAft>
+              <a:buNone/>
+            </a:pPr>
+            <a:r>
+              <a:rPr lang="en" sz="1000">
+                <a:solidFill>
+                  <a:srgbClr val="FA7815"/>
+                </a:solidFill>
+                <a:latin typeface="Roboto"/>
+                <a:ea typeface="Roboto"/>
+                <a:cs typeface="Roboto"/>
+                <a:sym typeface="Roboto"/>
+              </a:rPr>
+              <a:t>&lt;nav&gt;</a:t>
+            </a:r>
+            <a:endParaRPr sz="1000">
+              <a:solidFill>
+                <a:srgbClr val="FA7815"/>
+              </a:solidFill>
+              <a:latin typeface="Roboto"/>
+              <a:ea typeface="Roboto"/>
+              <a:cs typeface="Roboto"/>
+              <a:sym typeface="Roboto"/>
+            </a:endParaRPr>
+          </a:p>
+        </p:txBody>
+      </p:sp>
+      <p:sp>
+        <p:nvSpPr>
+          <p:cNvPr id="141" name="Google Shape;141;p18"/>
+          <p:cNvSpPr txBox="1"/>
+          <p:nvPr/>
+        </p:nvSpPr>
+        <p:spPr>
+          <a:xfrm>
+            <a:off x="5059675" y="977475"/>
+            <a:ext cx="999000" cy="305400"/>
+          </a:xfrm>
+          <a:prstGeom prst="rect">
+            <a:avLst/>
+          </a:prstGeom>
+          <a:noFill/>
+          <a:ln>
+            <a:noFill/>
+          </a:ln>
+        </p:spPr>
+        <p:txBody>
+          <a:bodyPr anchorCtr="0" anchor="t" bIns="91425" lIns="91425" spcFirstLastPara="1" rIns="91425" wrap="square" tIns="91425">
+            <a:noAutofit/>
+          </a:bodyPr>
+          <a:lstStyle/>
+          <a:p>
+            <a:pPr indent="0" lvl="0" marL="0" rtl="0" algn="l">
+              <a:spcBef>
+                <a:spcPts val="0"/>
+              </a:spcBef>
+              <a:spcAft>
+                <a:spcPts val="0"/>
+              </a:spcAft>
+              <a:buNone/>
+            </a:pPr>
+            <a:r>
+              <a:rPr lang="en" sz="1000">
+                <a:solidFill>
+                  <a:srgbClr val="FA7815"/>
+                </a:solidFill>
+                <a:latin typeface="Roboto"/>
+                <a:ea typeface="Roboto"/>
+                <a:cs typeface="Roboto"/>
+                <a:sym typeface="Roboto"/>
+              </a:rPr>
+              <a:t>&lt;ul&gt;&lt;li&gt;&lt;a&gt;</a:t>
+            </a:r>
+            <a:endParaRPr sz="1000">
+              <a:solidFill>
+                <a:srgbClr val="FA7815"/>
+              </a:solidFill>
+              <a:latin typeface="Roboto"/>
+              <a:ea typeface="Roboto"/>
+              <a:cs typeface="Roboto"/>
+              <a:sym typeface="Roboto"/>
+            </a:endParaRPr>
+          </a:p>
+        </p:txBody>
+      </p:sp>
+      <p:sp>
+        <p:nvSpPr>
+          <p:cNvPr id="142" name="Google Shape;142;p18"/>
+          <p:cNvSpPr txBox="1"/>
+          <p:nvPr/>
+        </p:nvSpPr>
+        <p:spPr>
+          <a:xfrm>
+            <a:off x="3107700" y="887350"/>
+            <a:ext cx="618600" cy="305400"/>
+          </a:xfrm>
+          <a:prstGeom prst="rect">
+            <a:avLst/>
+          </a:prstGeom>
+          <a:noFill/>
+          <a:ln>
+            <a:noFill/>
+          </a:ln>
+        </p:spPr>
+        <p:txBody>
+          <a:bodyPr anchorCtr="0" anchor="t" bIns="91425" lIns="91425" spcFirstLastPara="1" rIns="91425" wrap="square" tIns="91425">
+            <a:noAutofit/>
+          </a:bodyPr>
+          <a:lstStyle/>
+          <a:p>
+            <a:pPr indent="0" lvl="0" marL="0" rtl="0" algn="l">
+              <a:spcBef>
+                <a:spcPts val="0"/>
+              </a:spcBef>
+              <a:spcAft>
+                <a:spcPts val="0"/>
+              </a:spcAft>
+              <a:buNone/>
+            </a:pPr>
+            <a:r>
+              <a:rPr lang="en" sz="1000">
+                <a:solidFill>
+                  <a:srgbClr val="FA7815"/>
+                </a:solidFill>
+                <a:latin typeface="Roboto"/>
+                <a:ea typeface="Roboto"/>
+                <a:cs typeface="Roboto"/>
+                <a:sym typeface="Roboto"/>
+              </a:rPr>
+              <a:t>&lt;img&gt;</a:t>
+            </a:r>
+            <a:endParaRPr sz="1000">
+              <a:solidFill>
+                <a:srgbClr val="FA7815"/>
+              </a:solidFill>
+              <a:latin typeface="Roboto"/>
+              <a:ea typeface="Roboto"/>
+              <a:cs typeface="Roboto"/>
+              <a:sym typeface="Roboto"/>
+            </a:endParaRPr>
+          </a:p>
+        </p:txBody>
+      </p:sp>
+      <p:sp>
+        <p:nvSpPr>
+          <p:cNvPr id="143" name="Google Shape;143;p18"/>
+          <p:cNvSpPr txBox="1"/>
+          <p:nvPr/>
+        </p:nvSpPr>
+        <p:spPr>
+          <a:xfrm>
+            <a:off x="4777738" y="1387175"/>
+            <a:ext cx="618600" cy="305400"/>
+          </a:xfrm>
+          <a:prstGeom prst="rect">
+            <a:avLst/>
+          </a:prstGeom>
+          <a:noFill/>
+          <a:ln>
+            <a:noFill/>
+          </a:ln>
+        </p:spPr>
+        <p:txBody>
+          <a:bodyPr anchorCtr="0" anchor="t" bIns="91425" lIns="91425" spcFirstLastPara="1" rIns="91425" wrap="square" tIns="91425">
+            <a:noAutofit/>
+          </a:bodyPr>
+          <a:lstStyle/>
+          <a:p>
+            <a:pPr indent="0" lvl="0" marL="0" rtl="0" algn="l">
+              <a:spcBef>
+                <a:spcPts val="0"/>
+              </a:spcBef>
+              <a:spcAft>
+                <a:spcPts val="0"/>
+              </a:spcAft>
+              <a:buNone/>
+            </a:pPr>
+            <a:r>
+              <a:rPr lang="en" sz="1000">
+                <a:solidFill>
+                  <a:srgbClr val="FA7815"/>
+                </a:solidFill>
+                <a:latin typeface="Roboto"/>
+                <a:ea typeface="Roboto"/>
+                <a:cs typeface="Roboto"/>
+                <a:sym typeface="Roboto"/>
+              </a:rPr>
+              <a:t>&lt;h1&gt;</a:t>
+            </a:r>
+            <a:endParaRPr sz="1000">
+              <a:solidFill>
+                <a:srgbClr val="FA7815"/>
+              </a:solidFill>
+              <a:latin typeface="Roboto"/>
+              <a:ea typeface="Roboto"/>
+              <a:cs typeface="Roboto"/>
+              <a:sym typeface="Roboto"/>
+            </a:endParaRPr>
+          </a:p>
+        </p:txBody>
+      </p:sp>
+      <p:sp>
+        <p:nvSpPr>
+          <p:cNvPr id="144" name="Google Shape;144;p18"/>
+          <p:cNvSpPr txBox="1"/>
+          <p:nvPr/>
+        </p:nvSpPr>
+        <p:spPr>
+          <a:xfrm>
+            <a:off x="6407363" y="1951650"/>
+            <a:ext cx="618600" cy="305400"/>
+          </a:xfrm>
+          <a:prstGeom prst="rect">
+            <a:avLst/>
+          </a:prstGeom>
+          <a:noFill/>
+          <a:ln>
+            <a:noFill/>
+          </a:ln>
+        </p:spPr>
+        <p:txBody>
+          <a:bodyPr anchorCtr="0" anchor="t" bIns="91425" lIns="91425" spcFirstLastPara="1" rIns="91425" wrap="square" tIns="91425">
+            <a:noAutofit/>
+          </a:bodyPr>
+          <a:lstStyle/>
+          <a:p>
+            <a:pPr indent="0" lvl="0" marL="0" rtl="0" algn="l">
+              <a:spcBef>
+                <a:spcPts val="0"/>
+              </a:spcBef>
+              <a:spcAft>
+                <a:spcPts val="0"/>
+              </a:spcAft>
+              <a:buNone/>
+            </a:pPr>
+            <a:r>
+              <a:rPr lang="en" sz="1000">
+                <a:solidFill>
+                  <a:srgbClr val="FA7815"/>
+                </a:solidFill>
+                <a:latin typeface="Roboto"/>
+                <a:ea typeface="Roboto"/>
+                <a:cs typeface="Roboto"/>
+                <a:sym typeface="Roboto"/>
+              </a:rPr>
+              <a:t>&lt;h4&gt;</a:t>
+            </a:r>
+            <a:endParaRPr sz="1000">
+              <a:solidFill>
+                <a:srgbClr val="FA7815"/>
+              </a:solidFill>
+              <a:latin typeface="Roboto"/>
+              <a:ea typeface="Roboto"/>
+              <a:cs typeface="Roboto"/>
+              <a:sym typeface="Roboto"/>
+            </a:endParaRPr>
+          </a:p>
+        </p:txBody>
+      </p:sp>
+      <p:sp>
+        <p:nvSpPr>
+          <p:cNvPr id="145" name="Google Shape;145;p18"/>
+          <p:cNvSpPr txBox="1"/>
+          <p:nvPr/>
+        </p:nvSpPr>
+        <p:spPr>
+          <a:xfrm>
+            <a:off x="6655313" y="2942188"/>
+            <a:ext cx="618600" cy="305400"/>
+          </a:xfrm>
+          <a:prstGeom prst="rect">
+            <a:avLst/>
+          </a:prstGeom>
+          <a:noFill/>
+          <a:ln>
+            <a:noFill/>
+          </a:ln>
+        </p:spPr>
+        <p:txBody>
+          <a:bodyPr anchorCtr="0" anchor="t" bIns="91425" lIns="91425" spcFirstLastPara="1" rIns="91425" wrap="square" tIns="91425">
+            <a:noAutofit/>
+          </a:bodyPr>
+          <a:lstStyle/>
+          <a:p>
+            <a:pPr indent="0" lvl="0" marL="0" rtl="0" algn="l">
+              <a:spcBef>
+                <a:spcPts val="0"/>
+              </a:spcBef>
+              <a:spcAft>
+                <a:spcPts val="0"/>
+              </a:spcAft>
+              <a:buNone/>
+            </a:pPr>
+            <a:r>
+              <a:rPr lang="en" sz="1000">
+                <a:solidFill>
+                  <a:srgbClr val="FA7815"/>
+                </a:solidFill>
+                <a:latin typeface="Roboto"/>
+                <a:ea typeface="Roboto"/>
+                <a:cs typeface="Roboto"/>
+                <a:sym typeface="Roboto"/>
+              </a:rPr>
+              <a:t>&lt;h2&gt;</a:t>
+            </a:r>
+            <a:endParaRPr sz="1000">
+              <a:solidFill>
+                <a:srgbClr val="FA7815"/>
+              </a:solidFill>
+              <a:latin typeface="Roboto"/>
+              <a:ea typeface="Roboto"/>
+              <a:cs typeface="Roboto"/>
+              <a:sym typeface="Roboto"/>
+            </a:endParaRPr>
+          </a:p>
+        </p:txBody>
+      </p:sp>
+      <p:sp>
+        <p:nvSpPr>
+          <p:cNvPr id="146" name="Google Shape;146;p18"/>
+          <p:cNvSpPr txBox="1"/>
+          <p:nvPr/>
+        </p:nvSpPr>
+        <p:spPr>
+          <a:xfrm>
+            <a:off x="7684100" y="2275800"/>
+            <a:ext cx="618600" cy="305400"/>
+          </a:xfrm>
+          <a:prstGeom prst="rect">
+            <a:avLst/>
+          </a:prstGeom>
+          <a:noFill/>
+          <a:ln>
+            <a:noFill/>
+          </a:ln>
+        </p:spPr>
+        <p:txBody>
+          <a:bodyPr anchorCtr="0" anchor="t" bIns="91425" lIns="91425" spcFirstLastPara="1" rIns="91425" wrap="square" tIns="91425">
+            <a:noAutofit/>
+          </a:bodyPr>
+          <a:lstStyle/>
+          <a:p>
+            <a:pPr indent="0" lvl="0" marL="0" rtl="0" algn="l">
+              <a:spcBef>
+                <a:spcPts val="0"/>
+              </a:spcBef>
+              <a:spcAft>
+                <a:spcPts val="0"/>
+              </a:spcAft>
+              <a:buNone/>
+            </a:pPr>
+            <a:r>
+              <a:rPr lang="en" sz="1000">
+                <a:solidFill>
+                  <a:srgbClr val="FA7815"/>
+                </a:solidFill>
+                <a:latin typeface="Roboto"/>
+                <a:ea typeface="Roboto"/>
+                <a:cs typeface="Roboto"/>
+                <a:sym typeface="Roboto"/>
+              </a:rPr>
+              <a:t>&lt;img&gt;</a:t>
+            </a:r>
+            <a:endParaRPr sz="1000">
+              <a:solidFill>
+                <a:srgbClr val="FA7815"/>
+              </a:solidFill>
+              <a:latin typeface="Roboto"/>
+              <a:ea typeface="Roboto"/>
+              <a:cs typeface="Roboto"/>
+              <a:sym typeface="Roboto"/>
+            </a:endParaRPr>
+          </a:p>
+        </p:txBody>
+      </p:sp>
+      <p:sp>
+        <p:nvSpPr>
+          <p:cNvPr id="147" name="Google Shape;147;p18"/>
+          <p:cNvSpPr txBox="1"/>
+          <p:nvPr/>
+        </p:nvSpPr>
+        <p:spPr>
+          <a:xfrm>
+            <a:off x="3780675" y="3453400"/>
+            <a:ext cx="618600" cy="305400"/>
+          </a:xfrm>
+          <a:prstGeom prst="rect">
+            <a:avLst/>
+          </a:prstGeom>
+          <a:noFill/>
+          <a:ln>
+            <a:noFill/>
+          </a:ln>
+        </p:spPr>
+        <p:txBody>
+          <a:bodyPr anchorCtr="0" anchor="t" bIns="91425" lIns="91425" spcFirstLastPara="1" rIns="91425" wrap="square" tIns="91425">
+            <a:noAutofit/>
+          </a:bodyPr>
+          <a:lstStyle/>
+          <a:p>
+            <a:pPr indent="0" lvl="0" marL="0" rtl="0" algn="l">
+              <a:spcBef>
+                <a:spcPts val="0"/>
+              </a:spcBef>
+              <a:spcAft>
+                <a:spcPts val="0"/>
+              </a:spcAft>
+              <a:buNone/>
+            </a:pPr>
+            <a:r>
+              <a:rPr lang="en" sz="1000">
+                <a:solidFill>
+                  <a:srgbClr val="FA7815"/>
+                </a:solidFill>
+                <a:latin typeface="Roboto"/>
+                <a:ea typeface="Roboto"/>
+                <a:cs typeface="Roboto"/>
+                <a:sym typeface="Roboto"/>
+              </a:rPr>
+              <a:t>&lt;img&gt;</a:t>
+            </a:r>
+            <a:endParaRPr sz="1000">
+              <a:solidFill>
+                <a:srgbClr val="FA7815"/>
+              </a:solidFill>
+              <a:latin typeface="Roboto"/>
+              <a:ea typeface="Roboto"/>
+              <a:cs typeface="Roboto"/>
+              <a:sym typeface="Roboto"/>
+            </a:endParaRPr>
+          </a:p>
+        </p:txBody>
+      </p:sp>
+      <p:sp>
+        <p:nvSpPr>
+          <p:cNvPr id="148" name="Google Shape;148;p18"/>
+          <p:cNvSpPr txBox="1"/>
+          <p:nvPr/>
+        </p:nvSpPr>
+        <p:spPr>
+          <a:xfrm>
+            <a:off x="5182450" y="3453400"/>
+            <a:ext cx="618600" cy="305400"/>
+          </a:xfrm>
+          <a:prstGeom prst="rect">
+            <a:avLst/>
+          </a:prstGeom>
+          <a:noFill/>
+          <a:ln>
+            <a:noFill/>
+          </a:ln>
+        </p:spPr>
+        <p:txBody>
+          <a:bodyPr anchorCtr="0" anchor="t" bIns="91425" lIns="91425" spcFirstLastPara="1" rIns="91425" wrap="square" tIns="91425">
+            <a:noAutofit/>
+          </a:bodyPr>
+          <a:lstStyle/>
+          <a:p>
+            <a:pPr indent="0" lvl="0" marL="0" rtl="0" algn="l">
+              <a:spcBef>
+                <a:spcPts val="0"/>
+              </a:spcBef>
+              <a:spcAft>
+                <a:spcPts val="0"/>
+              </a:spcAft>
+              <a:buNone/>
+            </a:pPr>
+            <a:r>
+              <a:rPr lang="en" sz="1000">
+                <a:solidFill>
+                  <a:srgbClr val="FA7815"/>
+                </a:solidFill>
+                <a:latin typeface="Roboto"/>
+                <a:ea typeface="Roboto"/>
+                <a:cs typeface="Roboto"/>
+                <a:sym typeface="Roboto"/>
+              </a:rPr>
+              <a:t>&lt;img&gt;</a:t>
+            </a:r>
+            <a:endParaRPr sz="1000">
+              <a:solidFill>
+                <a:srgbClr val="FA7815"/>
+              </a:solidFill>
+              <a:latin typeface="Roboto"/>
+              <a:ea typeface="Roboto"/>
+              <a:cs typeface="Roboto"/>
+              <a:sym typeface="Roboto"/>
+            </a:endParaRPr>
+          </a:p>
+        </p:txBody>
+      </p:sp>
+      <p:sp>
+        <p:nvSpPr>
+          <p:cNvPr id="149" name="Google Shape;149;p18"/>
+          <p:cNvSpPr txBox="1"/>
+          <p:nvPr/>
+        </p:nvSpPr>
+        <p:spPr>
+          <a:xfrm>
+            <a:off x="6584225" y="3453400"/>
+            <a:ext cx="618600" cy="305400"/>
+          </a:xfrm>
+          <a:prstGeom prst="rect">
+            <a:avLst/>
+          </a:prstGeom>
+          <a:noFill/>
+          <a:ln>
+            <a:noFill/>
+          </a:ln>
+        </p:spPr>
+        <p:txBody>
+          <a:bodyPr anchorCtr="0" anchor="t" bIns="91425" lIns="91425" spcFirstLastPara="1" rIns="91425" wrap="square" tIns="91425">
+            <a:noAutofit/>
+          </a:bodyPr>
+          <a:lstStyle/>
+          <a:p>
+            <a:pPr indent="0" lvl="0" marL="0" rtl="0" algn="l">
+              <a:spcBef>
+                <a:spcPts val="0"/>
+              </a:spcBef>
+              <a:spcAft>
+                <a:spcPts val="0"/>
+              </a:spcAft>
+              <a:buNone/>
+            </a:pPr>
+            <a:r>
+              <a:rPr lang="en" sz="1000">
+                <a:solidFill>
+                  <a:srgbClr val="FA7815"/>
+                </a:solidFill>
+                <a:latin typeface="Roboto"/>
+                <a:ea typeface="Roboto"/>
+                <a:cs typeface="Roboto"/>
+                <a:sym typeface="Roboto"/>
+              </a:rPr>
+              <a:t>&lt;img&gt;</a:t>
+            </a:r>
+            <a:endParaRPr sz="1000">
+              <a:solidFill>
+                <a:srgbClr val="FA7815"/>
+              </a:solidFill>
+              <a:latin typeface="Roboto"/>
+              <a:ea typeface="Roboto"/>
+              <a:cs typeface="Roboto"/>
+              <a:sym typeface="Roboto"/>
+            </a:endParaRPr>
+          </a:p>
+        </p:txBody>
+      </p:sp>
+      <p:sp>
+        <p:nvSpPr>
+          <p:cNvPr id="150" name="Google Shape;150;p18"/>
+          <p:cNvSpPr txBox="1"/>
+          <p:nvPr/>
+        </p:nvSpPr>
+        <p:spPr>
+          <a:xfrm>
+            <a:off x="8098700" y="3453400"/>
+            <a:ext cx="618600" cy="305400"/>
+          </a:xfrm>
+          <a:prstGeom prst="rect">
+            <a:avLst/>
+          </a:prstGeom>
+          <a:noFill/>
+          <a:ln>
+            <a:noFill/>
+          </a:ln>
+        </p:spPr>
+        <p:txBody>
+          <a:bodyPr anchorCtr="0" anchor="t" bIns="91425" lIns="91425" spcFirstLastPara="1" rIns="91425" wrap="square" tIns="91425">
+            <a:noAutofit/>
+          </a:bodyPr>
+          <a:lstStyle/>
+          <a:p>
+            <a:pPr indent="0" lvl="0" marL="0" rtl="0" algn="l">
+              <a:spcBef>
+                <a:spcPts val="0"/>
+              </a:spcBef>
+              <a:spcAft>
+                <a:spcPts val="0"/>
+              </a:spcAft>
+              <a:buNone/>
+            </a:pPr>
+            <a:r>
+              <a:rPr lang="en" sz="1000">
+                <a:solidFill>
+                  <a:srgbClr val="FA7815"/>
+                </a:solidFill>
+                <a:latin typeface="Roboto"/>
+                <a:ea typeface="Roboto"/>
+                <a:cs typeface="Roboto"/>
+                <a:sym typeface="Roboto"/>
+              </a:rPr>
+              <a:t>&lt;img&gt;</a:t>
+            </a:r>
+            <a:endParaRPr sz="1000">
+              <a:solidFill>
+                <a:srgbClr val="FA7815"/>
+              </a:solidFill>
+              <a:latin typeface="Roboto"/>
+              <a:ea typeface="Roboto"/>
+              <a:cs typeface="Roboto"/>
+              <a:sym typeface="Roboto"/>
+            </a:endParaRPr>
+          </a:p>
+        </p:txBody>
+      </p:sp>
+      <p:sp>
+        <p:nvSpPr>
+          <p:cNvPr id="151" name="Google Shape;151;p18"/>
+          <p:cNvSpPr txBox="1"/>
+          <p:nvPr/>
+        </p:nvSpPr>
+        <p:spPr>
+          <a:xfrm>
+            <a:off x="5299225" y="4679025"/>
+            <a:ext cx="618600" cy="305400"/>
+          </a:xfrm>
+          <a:prstGeom prst="rect">
+            <a:avLst/>
+          </a:prstGeom>
+          <a:noFill/>
+          <a:ln>
+            <a:noFill/>
+          </a:ln>
+        </p:spPr>
+        <p:txBody>
+          <a:bodyPr anchorCtr="0" anchor="t" bIns="91425" lIns="91425" spcFirstLastPara="1" rIns="91425" wrap="square" tIns="91425">
+            <a:noAutofit/>
+          </a:bodyPr>
+          <a:lstStyle/>
+          <a:p>
+            <a:pPr indent="0" lvl="0" marL="0" rtl="0" algn="l">
+              <a:spcBef>
+                <a:spcPts val="0"/>
+              </a:spcBef>
+              <a:spcAft>
+                <a:spcPts val="0"/>
+              </a:spcAft>
+              <a:buNone/>
+            </a:pPr>
+            <a:r>
+              <a:rPr lang="en" sz="1000">
+                <a:solidFill>
+                  <a:srgbClr val="FA7815"/>
+                </a:solidFill>
+                <a:latin typeface="Roboto"/>
+                <a:ea typeface="Roboto"/>
+                <a:cs typeface="Roboto"/>
+                <a:sym typeface="Roboto"/>
+              </a:rPr>
+              <a:t>&lt;h4&gt;</a:t>
+            </a:r>
+            <a:endParaRPr sz="1000">
+              <a:solidFill>
+                <a:srgbClr val="FA7815"/>
+              </a:solidFill>
+              <a:latin typeface="Roboto"/>
+              <a:ea typeface="Roboto"/>
+              <a:cs typeface="Roboto"/>
+              <a:sym typeface="Roboto"/>
+            </a:endParaRPr>
+          </a:p>
+        </p:txBody>
+      </p:sp>
+      <p:sp>
+        <p:nvSpPr>
+          <p:cNvPr id="152" name="Google Shape;152;p18"/>
+          <p:cNvSpPr txBox="1"/>
+          <p:nvPr/>
+        </p:nvSpPr>
+        <p:spPr>
+          <a:xfrm>
+            <a:off x="6823225" y="4676100"/>
+            <a:ext cx="618600" cy="305400"/>
+          </a:xfrm>
+          <a:prstGeom prst="rect">
+            <a:avLst/>
+          </a:prstGeom>
+          <a:noFill/>
+          <a:ln>
+            <a:noFill/>
+          </a:ln>
+        </p:spPr>
+        <p:txBody>
+          <a:bodyPr anchorCtr="0" anchor="t" bIns="91425" lIns="91425" spcFirstLastPara="1" rIns="91425" wrap="square" tIns="91425">
+            <a:noAutofit/>
+          </a:bodyPr>
+          <a:lstStyle/>
+          <a:p>
+            <a:pPr indent="0" lvl="0" marL="0" rtl="0" algn="l">
+              <a:spcBef>
+                <a:spcPts val="0"/>
+              </a:spcBef>
+              <a:spcAft>
+                <a:spcPts val="0"/>
+              </a:spcAft>
+              <a:buNone/>
+            </a:pPr>
+            <a:r>
+              <a:rPr lang="en" sz="1000">
+                <a:solidFill>
+                  <a:srgbClr val="FA7815"/>
+                </a:solidFill>
+                <a:latin typeface="Roboto"/>
+                <a:ea typeface="Roboto"/>
+                <a:cs typeface="Roboto"/>
+                <a:sym typeface="Roboto"/>
+              </a:rPr>
+              <a:t>&lt;h4&gt;</a:t>
+            </a:r>
+            <a:endParaRPr sz="1000">
+              <a:solidFill>
+                <a:srgbClr val="FA7815"/>
+              </a:solidFill>
+              <a:latin typeface="Roboto"/>
+              <a:ea typeface="Roboto"/>
+              <a:cs typeface="Roboto"/>
+              <a:sym typeface="Roboto"/>
+            </a:endParaRPr>
+          </a:p>
+        </p:txBody>
+      </p:sp>
+      <p:sp>
+        <p:nvSpPr>
+          <p:cNvPr id="153" name="Google Shape;153;p18"/>
+          <p:cNvSpPr txBox="1"/>
+          <p:nvPr/>
+        </p:nvSpPr>
+        <p:spPr>
+          <a:xfrm>
+            <a:off x="8202450" y="4679025"/>
+            <a:ext cx="618600" cy="305400"/>
+          </a:xfrm>
+          <a:prstGeom prst="rect">
+            <a:avLst/>
+          </a:prstGeom>
+          <a:noFill/>
+          <a:ln>
+            <a:noFill/>
+          </a:ln>
+        </p:spPr>
+        <p:txBody>
+          <a:bodyPr anchorCtr="0" anchor="t" bIns="91425" lIns="91425" spcFirstLastPara="1" rIns="91425" wrap="square" tIns="91425">
+            <a:noAutofit/>
+          </a:bodyPr>
+          <a:lstStyle/>
+          <a:p>
+            <a:pPr indent="0" lvl="0" marL="0" rtl="0" algn="l">
+              <a:spcBef>
+                <a:spcPts val="0"/>
+              </a:spcBef>
+              <a:spcAft>
+                <a:spcPts val="0"/>
+              </a:spcAft>
+              <a:buNone/>
+            </a:pPr>
+            <a:r>
+              <a:rPr lang="en" sz="1000">
+                <a:solidFill>
+                  <a:srgbClr val="FA7815"/>
+                </a:solidFill>
+                <a:latin typeface="Roboto"/>
+                <a:ea typeface="Roboto"/>
+                <a:cs typeface="Roboto"/>
+                <a:sym typeface="Roboto"/>
+              </a:rPr>
+              <a:t>&lt;h4&gt;</a:t>
+            </a:r>
+            <a:endParaRPr sz="1000">
+              <a:solidFill>
+                <a:srgbClr val="FA7815"/>
+              </a:solidFill>
+              <a:latin typeface="Roboto"/>
+              <a:ea typeface="Roboto"/>
+              <a:cs typeface="Roboto"/>
+              <a:sym typeface="Roboto"/>
+            </a:endParaRPr>
+          </a:p>
+        </p:txBody>
+      </p:sp>
+      <p:sp>
+        <p:nvSpPr>
+          <p:cNvPr id="154" name="Google Shape;154;p18"/>
+          <p:cNvSpPr txBox="1"/>
+          <p:nvPr/>
+        </p:nvSpPr>
+        <p:spPr>
+          <a:xfrm>
+            <a:off x="3923750" y="4676100"/>
+            <a:ext cx="618600" cy="305400"/>
+          </a:xfrm>
+          <a:prstGeom prst="rect">
+            <a:avLst/>
+          </a:prstGeom>
+          <a:noFill/>
+          <a:ln>
+            <a:noFill/>
+          </a:ln>
+        </p:spPr>
+        <p:txBody>
+          <a:bodyPr anchorCtr="0" anchor="t" bIns="91425" lIns="91425" spcFirstLastPara="1" rIns="91425" wrap="square" tIns="91425">
+            <a:noAutofit/>
+          </a:bodyPr>
+          <a:lstStyle/>
+          <a:p>
+            <a:pPr indent="0" lvl="0" marL="0" rtl="0" algn="l">
+              <a:spcBef>
+                <a:spcPts val="0"/>
+              </a:spcBef>
+              <a:spcAft>
+                <a:spcPts val="0"/>
+              </a:spcAft>
+              <a:buNone/>
+            </a:pPr>
+            <a:r>
+              <a:rPr lang="en" sz="1000">
+                <a:solidFill>
+                  <a:srgbClr val="FA7815"/>
+                </a:solidFill>
+                <a:latin typeface="Roboto"/>
+                <a:ea typeface="Roboto"/>
+                <a:cs typeface="Roboto"/>
+                <a:sym typeface="Roboto"/>
+              </a:rPr>
+              <a:t>&lt;h4&gt;</a:t>
+            </a:r>
+            <a:endParaRPr sz="1000">
+              <a:solidFill>
+                <a:srgbClr val="FA7815"/>
+              </a:solidFill>
+              <a:latin typeface="Roboto"/>
+              <a:ea typeface="Roboto"/>
+              <a:cs typeface="Roboto"/>
+              <a:sym typeface="Roboto"/>
+            </a:endParaRPr>
+          </a:p>
+        </p:txBody>
+      </p:sp>
     </p:spTree>
   </p:cSld>
   <p:clrMapOvr>
@@ -10875,7 +11870,7 @@
   <p:cSld>
     <p:spTree>
       <p:nvGrpSpPr>
-        <p:cNvPr id="141" name="Shape 141"/>
+        <p:cNvPr id="158" name="Shape 158"/>
         <p:cNvGrpSpPr/>
         <p:nvPr/>
       </p:nvGrpSpPr>
@@ -10889,7 +11884,7 @@
       </p:grpSpPr>
       <p:sp>
         <p:nvSpPr>
-          <p:cNvPr id="142" name="Google Shape;142;p19"/>
+          <p:cNvPr id="159" name="Google Shape;159;p19"/>
           <p:cNvSpPr txBox="1"/>
           <p:nvPr>
             <p:ph idx="4294967295" type="title"/>
@@ -10946,7 +11941,7 @@
       </p:sp>
       <p:grpSp>
         <p:nvGrpSpPr>
-          <p:cNvPr id="143" name="Google Shape;143;p19"/>
+          <p:cNvPr id="160" name="Google Shape;160;p19"/>
           <p:cNvGrpSpPr/>
           <p:nvPr/>
         </p:nvGrpSpPr>
@@ -10960,7 +11955,7 @@
         </p:grpSpPr>
         <p:sp>
           <p:nvSpPr>
-            <p:cNvPr id="144" name="Google Shape;144;p19"/>
+            <p:cNvPr id="161" name="Google Shape;161;p19"/>
             <p:cNvSpPr/>
             <p:nvPr/>
           </p:nvSpPr>
@@ -11014,7 +12009,7 @@
         </p:sp>
         <p:grpSp>
           <p:nvGrpSpPr>
-            <p:cNvPr id="145" name="Google Shape;145;p19"/>
+            <p:cNvPr id="162" name="Google Shape;162;p19"/>
             <p:cNvGrpSpPr/>
             <p:nvPr/>
           </p:nvGrpSpPr>
@@ -11028,7 +12023,7 @@
           </p:grpSpPr>
           <p:sp>
             <p:nvSpPr>
-              <p:cNvPr id="146" name="Google Shape;146;p19"/>
+              <p:cNvPr id="163" name="Google Shape;163;p19"/>
               <p:cNvSpPr/>
               <p:nvPr/>
             </p:nvSpPr>
@@ -11080,7 +12075,7 @@
           </p:sp>
           <p:sp>
             <p:nvSpPr>
-              <p:cNvPr id="147" name="Google Shape;147;p19"/>
+              <p:cNvPr id="164" name="Google Shape;164;p19"/>
               <p:cNvSpPr/>
               <p:nvPr/>
             </p:nvSpPr>
@@ -11132,7 +12127,7 @@
           </p:sp>
           <p:sp>
             <p:nvSpPr>
-              <p:cNvPr id="148" name="Google Shape;148;p19"/>
+              <p:cNvPr id="165" name="Google Shape;165;p19"/>
               <p:cNvSpPr/>
               <p:nvPr/>
             </p:nvSpPr>
@@ -11185,7 +12180,7 @@
         </p:grpSp>
         <p:sp>
           <p:nvSpPr>
-            <p:cNvPr id="149" name="Google Shape;149;p19"/>
+            <p:cNvPr id="166" name="Google Shape;166;p19"/>
             <p:cNvSpPr/>
             <p:nvPr/>
           </p:nvSpPr>
@@ -11238,7 +12233,7 @@
       </p:grpSp>
       <p:sp>
         <p:nvSpPr>
-          <p:cNvPr id="150" name="Google Shape;150;p19"/>
+          <p:cNvPr id="167" name="Google Shape;167;p19"/>
           <p:cNvSpPr/>
           <p:nvPr/>
         </p:nvSpPr>
@@ -11336,7 +12331,7 @@
       </p:sp>
       <p:sp>
         <p:nvSpPr>
-          <p:cNvPr id="151" name="Google Shape;151;p19"/>
+          <p:cNvPr id="168" name="Google Shape;168;p19"/>
           <p:cNvSpPr/>
           <p:nvPr/>
         </p:nvSpPr>
@@ -11409,9 +12404,18 @@
               <a:buNone/>
             </a:pPr>
             <a:r>
-              <a:t/>
+              <a:rPr b="1" lang="en" sz="1000">
+                <a:solidFill>
+                  <a:srgbClr val="FA7815"/>
+                </a:solidFill>
+                <a:latin typeface="Roboto Mono"/>
+                <a:ea typeface="Roboto Mono"/>
+                <a:cs typeface="Roboto Mono"/>
+                <a:sym typeface="Roboto Mono"/>
+              </a:rPr>
+              <a:t>&lt;header&gt; - will be above main, will include &lt;h1&gt; heading “Portfolio”, with &lt;p&gt; paragraph briefly describing contents of page</a:t>
             </a:r>
-            <a:endParaRPr b="1" sz="1200">
+            <a:endParaRPr b="1" sz="1000">
               <a:solidFill>
                 <a:srgbClr val="FA7815"/>
               </a:solidFill>
@@ -11471,7 +12475,7 @@
       </p:sp>
       <p:grpSp>
         <p:nvGrpSpPr>
-          <p:cNvPr id="152" name="Google Shape;152;p19"/>
+          <p:cNvPr id="169" name="Google Shape;169;p19"/>
           <p:cNvGrpSpPr/>
           <p:nvPr/>
         </p:nvGrpSpPr>
@@ -11485,7 +12489,7 @@
         </p:grpSpPr>
         <p:sp>
           <p:nvSpPr>
-            <p:cNvPr id="153" name="Google Shape;153;p19"/>
+            <p:cNvPr id="170" name="Google Shape;170;p19"/>
             <p:cNvSpPr/>
             <p:nvPr/>
           </p:nvSpPr>
@@ -11549,7 +12553,7 @@
         </p:sp>
         <p:grpSp>
           <p:nvGrpSpPr>
-            <p:cNvPr id="154" name="Google Shape;154;p19"/>
+            <p:cNvPr id="171" name="Google Shape;171;p19"/>
             <p:cNvGrpSpPr/>
             <p:nvPr/>
           </p:nvGrpSpPr>
@@ -11563,7 +12567,7 @@
           </p:grpSpPr>
           <p:sp>
             <p:nvSpPr>
-              <p:cNvPr id="155" name="Google Shape;155;p19"/>
+              <p:cNvPr id="172" name="Google Shape;172;p19"/>
               <p:cNvSpPr/>
               <p:nvPr/>
             </p:nvSpPr>
@@ -11629,7 +12633,7 @@
           </p:sp>
           <p:sp>
             <p:nvSpPr>
-              <p:cNvPr id="156" name="Google Shape;156;p19"/>
+              <p:cNvPr id="173" name="Google Shape;173;p19"/>
               <p:cNvSpPr/>
               <p:nvPr/>
             </p:nvSpPr>
@@ -11697,7 +12701,7 @@
       </p:grpSp>
       <p:sp>
         <p:nvSpPr>
-          <p:cNvPr id="157" name="Google Shape;157;p19"/>
+          <p:cNvPr id="174" name="Google Shape;174;p19"/>
           <p:cNvSpPr txBox="1"/>
           <p:nvPr/>
         </p:nvSpPr>
@@ -11761,7 +12765,7 @@
       </p:sp>
       <p:sp>
         <p:nvSpPr>
-          <p:cNvPr id="158" name="Google Shape;158;p19"/>
+          <p:cNvPr id="175" name="Google Shape;175;p19"/>
           <p:cNvSpPr txBox="1"/>
           <p:nvPr/>
         </p:nvSpPr>
@@ -11825,7 +12829,7 @@
       </p:sp>
       <p:sp>
         <p:nvSpPr>
-          <p:cNvPr id="159" name="Google Shape;159;p19"/>
+          <p:cNvPr id="176" name="Google Shape;176;p19"/>
           <p:cNvSpPr/>
           <p:nvPr/>
         </p:nvSpPr>
@@ -11893,7 +12897,7 @@
       </p:sp>
       <p:sp>
         <p:nvSpPr>
-          <p:cNvPr id="160" name="Google Shape;160;p19"/>
+          <p:cNvPr id="177" name="Google Shape;177;p19"/>
           <p:cNvSpPr/>
           <p:nvPr/>
         </p:nvSpPr>
@@ -11961,7 +12965,7 @@
       </p:sp>
       <p:sp>
         <p:nvSpPr>
-          <p:cNvPr id="161" name="Google Shape;161;p19"/>
+          <p:cNvPr id="178" name="Google Shape;178;p19"/>
           <p:cNvSpPr txBox="1"/>
           <p:nvPr/>
         </p:nvSpPr>
@@ -12025,7 +13029,7 @@
       </p:sp>
       <p:sp>
         <p:nvSpPr>
-          <p:cNvPr id="162" name="Google Shape;162;p19"/>
+          <p:cNvPr id="179" name="Google Shape;179;p19"/>
           <p:cNvSpPr txBox="1"/>
           <p:nvPr/>
         </p:nvSpPr>
@@ -12089,7 +13093,7 @@
       </p:sp>
       <p:sp>
         <p:nvSpPr>
-          <p:cNvPr id="163" name="Google Shape;163;p19"/>
+          <p:cNvPr id="180" name="Google Shape;180;p19"/>
           <p:cNvSpPr txBox="1"/>
           <p:nvPr/>
         </p:nvSpPr>
@@ -12153,7 +13157,7 @@
       </p:sp>
       <p:sp>
         <p:nvSpPr>
-          <p:cNvPr id="164" name="Google Shape;164;p19"/>
+          <p:cNvPr id="181" name="Google Shape;181;p19"/>
           <p:cNvSpPr/>
           <p:nvPr/>
         </p:nvSpPr>
@@ -12221,7 +13225,7 @@
       </p:sp>
       <p:sp>
         <p:nvSpPr>
-          <p:cNvPr id="165" name="Google Shape;165;p19"/>
+          <p:cNvPr id="182" name="Google Shape;182;p19"/>
           <p:cNvSpPr txBox="1"/>
           <p:nvPr/>
         </p:nvSpPr>
@@ -12285,7 +13289,7 @@
       </p:sp>
       <p:sp>
         <p:nvSpPr>
-          <p:cNvPr id="166" name="Google Shape;166;p19"/>
+          <p:cNvPr id="183" name="Google Shape;183;p19"/>
           <p:cNvSpPr/>
           <p:nvPr/>
         </p:nvSpPr>
@@ -12353,7 +13357,7 @@
       </p:sp>
       <p:sp>
         <p:nvSpPr>
-          <p:cNvPr id="167" name="Google Shape;167;p19"/>
+          <p:cNvPr id="184" name="Google Shape;184;p19"/>
           <p:cNvSpPr txBox="1"/>
           <p:nvPr/>
         </p:nvSpPr>
@@ -12417,7 +13421,7 @@
       </p:sp>
       <p:sp>
         <p:nvSpPr>
-          <p:cNvPr id="168" name="Google Shape;168;p19"/>
+          <p:cNvPr id="185" name="Google Shape;185;p19"/>
           <p:cNvSpPr/>
           <p:nvPr/>
         </p:nvSpPr>
@@ -12485,7 +13489,7 @@
       </p:sp>
       <p:sp>
         <p:nvSpPr>
-          <p:cNvPr id="169" name="Google Shape;169;p19"/>
+          <p:cNvPr id="186" name="Google Shape;186;p19"/>
           <p:cNvSpPr txBox="1"/>
           <p:nvPr/>
         </p:nvSpPr>
@@ -12547,6 +13551,1050 @@
           </a:p>
         </p:txBody>
       </p:sp>
+      <p:sp>
+        <p:nvSpPr>
+          <p:cNvPr id="187" name="Google Shape;187;p19"/>
+          <p:cNvSpPr txBox="1"/>
+          <p:nvPr/>
+        </p:nvSpPr>
+        <p:spPr>
+          <a:xfrm>
+            <a:off x="4655950" y="977475"/>
+            <a:ext cx="526500" cy="305400"/>
+          </a:xfrm>
+          <a:prstGeom prst="rect">
+            <a:avLst/>
+          </a:prstGeom>
+          <a:noFill/>
+          <a:ln>
+            <a:noFill/>
+          </a:ln>
+        </p:spPr>
+        <p:txBody>
+          <a:bodyPr anchorCtr="0" anchor="t" bIns="91425" lIns="91425" spcFirstLastPara="1" rIns="91425" wrap="square" tIns="91425">
+            <a:noAutofit/>
+          </a:bodyPr>
+          <a:lstStyle/>
+          <a:p>
+            <a:pPr indent="0" lvl="0" marL="0" rtl="0" algn="l">
+              <a:spcBef>
+                <a:spcPts val="0"/>
+              </a:spcBef>
+              <a:spcAft>
+                <a:spcPts val="0"/>
+              </a:spcAft>
+              <a:buNone/>
+            </a:pPr>
+            <a:r>
+              <a:rPr lang="en" sz="1000">
+                <a:solidFill>
+                  <a:srgbClr val="FA7815"/>
+                </a:solidFill>
+                <a:latin typeface="Roboto"/>
+                <a:ea typeface="Roboto"/>
+                <a:cs typeface="Roboto"/>
+                <a:sym typeface="Roboto"/>
+              </a:rPr>
+              <a:t>&lt;nav&gt;</a:t>
+            </a:r>
+            <a:endParaRPr sz="1000">
+              <a:solidFill>
+                <a:srgbClr val="FA7815"/>
+              </a:solidFill>
+              <a:latin typeface="Roboto"/>
+              <a:ea typeface="Roboto"/>
+              <a:cs typeface="Roboto"/>
+              <a:sym typeface="Roboto"/>
+            </a:endParaRPr>
+          </a:p>
+        </p:txBody>
+      </p:sp>
+      <p:sp>
+        <p:nvSpPr>
+          <p:cNvPr id="188" name="Google Shape;188;p19"/>
+          <p:cNvSpPr txBox="1"/>
+          <p:nvPr/>
+        </p:nvSpPr>
+        <p:spPr>
+          <a:xfrm>
+            <a:off x="8161025" y="1387175"/>
+            <a:ext cx="618600" cy="305400"/>
+          </a:xfrm>
+          <a:prstGeom prst="rect">
+            <a:avLst/>
+          </a:prstGeom>
+          <a:noFill/>
+          <a:ln>
+            <a:noFill/>
+          </a:ln>
+        </p:spPr>
+        <p:txBody>
+          <a:bodyPr anchorCtr="0" anchor="t" bIns="91425" lIns="91425" spcFirstLastPara="1" rIns="91425" wrap="square" tIns="91425">
+            <a:noAutofit/>
+          </a:bodyPr>
+          <a:lstStyle/>
+          <a:p>
+            <a:pPr indent="0" lvl="0" marL="0" rtl="0" algn="l">
+              <a:spcBef>
+                <a:spcPts val="0"/>
+              </a:spcBef>
+              <a:spcAft>
+                <a:spcPts val="0"/>
+              </a:spcAft>
+              <a:buNone/>
+            </a:pPr>
+            <a:r>
+              <a:rPr lang="en" sz="1000">
+                <a:solidFill>
+                  <a:srgbClr val="FA7815"/>
+                </a:solidFill>
+                <a:latin typeface="Roboto"/>
+                <a:ea typeface="Roboto"/>
+                <a:cs typeface="Roboto"/>
+                <a:sym typeface="Roboto"/>
+              </a:rPr>
+              <a:t>&lt;main&gt;</a:t>
+            </a:r>
+            <a:endParaRPr sz="1000">
+              <a:solidFill>
+                <a:srgbClr val="FA7815"/>
+              </a:solidFill>
+              <a:latin typeface="Roboto"/>
+              <a:ea typeface="Roboto"/>
+              <a:cs typeface="Roboto"/>
+              <a:sym typeface="Roboto"/>
+            </a:endParaRPr>
+          </a:p>
+        </p:txBody>
+      </p:sp>
+      <p:sp>
+        <p:nvSpPr>
+          <p:cNvPr id="189" name="Google Shape;189;p19"/>
+          <p:cNvSpPr txBox="1"/>
+          <p:nvPr/>
+        </p:nvSpPr>
+        <p:spPr>
+          <a:xfrm>
+            <a:off x="6530350" y="1387175"/>
+            <a:ext cx="618600" cy="305400"/>
+          </a:xfrm>
+          <a:prstGeom prst="rect">
+            <a:avLst/>
+          </a:prstGeom>
+          <a:noFill/>
+          <a:ln>
+            <a:noFill/>
+          </a:ln>
+        </p:spPr>
+        <p:txBody>
+          <a:bodyPr anchorCtr="0" anchor="t" bIns="91425" lIns="91425" spcFirstLastPara="1" rIns="91425" wrap="square" tIns="91425">
+            <a:noAutofit/>
+          </a:bodyPr>
+          <a:lstStyle/>
+          <a:p>
+            <a:pPr indent="0" lvl="0" marL="0" rtl="0" algn="l">
+              <a:spcBef>
+                <a:spcPts val="0"/>
+              </a:spcBef>
+              <a:spcAft>
+                <a:spcPts val="0"/>
+              </a:spcAft>
+              <a:buNone/>
+            </a:pPr>
+            <a:r>
+              <a:rPr lang="en" sz="1000">
+                <a:solidFill>
+                  <a:srgbClr val="FA7815"/>
+                </a:solidFill>
+                <a:latin typeface="Roboto"/>
+                <a:ea typeface="Roboto"/>
+                <a:cs typeface="Roboto"/>
+                <a:sym typeface="Roboto"/>
+              </a:rPr>
+              <a:t>&lt;h2&gt;</a:t>
+            </a:r>
+            <a:endParaRPr sz="1000">
+              <a:solidFill>
+                <a:srgbClr val="FA7815"/>
+              </a:solidFill>
+              <a:latin typeface="Roboto"/>
+              <a:ea typeface="Roboto"/>
+              <a:cs typeface="Roboto"/>
+              <a:sym typeface="Roboto"/>
+            </a:endParaRPr>
+          </a:p>
+        </p:txBody>
+      </p:sp>
+      <p:sp>
+        <p:nvSpPr>
+          <p:cNvPr id="190" name="Google Shape;190;p19"/>
+          <p:cNvSpPr txBox="1"/>
+          <p:nvPr/>
+        </p:nvSpPr>
+        <p:spPr>
+          <a:xfrm>
+            <a:off x="6721275" y="3147375"/>
+            <a:ext cx="618600" cy="305400"/>
+          </a:xfrm>
+          <a:prstGeom prst="rect">
+            <a:avLst/>
+          </a:prstGeom>
+          <a:noFill/>
+          <a:ln>
+            <a:noFill/>
+          </a:ln>
+        </p:spPr>
+        <p:txBody>
+          <a:bodyPr anchorCtr="0" anchor="t" bIns="91425" lIns="91425" spcFirstLastPara="1" rIns="91425" wrap="square" tIns="91425">
+            <a:noAutofit/>
+          </a:bodyPr>
+          <a:lstStyle/>
+          <a:p>
+            <a:pPr indent="0" lvl="0" marL="0" rtl="0" algn="l">
+              <a:spcBef>
+                <a:spcPts val="0"/>
+              </a:spcBef>
+              <a:spcAft>
+                <a:spcPts val="0"/>
+              </a:spcAft>
+              <a:buNone/>
+            </a:pPr>
+            <a:r>
+              <a:rPr lang="en" sz="1000">
+                <a:solidFill>
+                  <a:srgbClr val="FA7815"/>
+                </a:solidFill>
+                <a:latin typeface="Roboto"/>
+                <a:ea typeface="Roboto"/>
+                <a:cs typeface="Roboto"/>
+                <a:sym typeface="Roboto"/>
+              </a:rPr>
+              <a:t>&lt;h2&gt;</a:t>
+            </a:r>
+            <a:endParaRPr sz="1000">
+              <a:solidFill>
+                <a:srgbClr val="FA7815"/>
+              </a:solidFill>
+              <a:latin typeface="Roboto"/>
+              <a:ea typeface="Roboto"/>
+              <a:cs typeface="Roboto"/>
+              <a:sym typeface="Roboto"/>
+            </a:endParaRPr>
+          </a:p>
+        </p:txBody>
+      </p:sp>
+      <p:sp>
+        <p:nvSpPr>
+          <p:cNvPr id="191" name="Google Shape;191;p19"/>
+          <p:cNvSpPr txBox="1"/>
+          <p:nvPr/>
+        </p:nvSpPr>
+        <p:spPr>
+          <a:xfrm>
+            <a:off x="5303525" y="2629225"/>
+            <a:ext cx="618600" cy="305400"/>
+          </a:xfrm>
+          <a:prstGeom prst="rect">
+            <a:avLst/>
+          </a:prstGeom>
+          <a:noFill/>
+          <a:ln>
+            <a:noFill/>
+          </a:ln>
+        </p:spPr>
+        <p:txBody>
+          <a:bodyPr anchorCtr="0" anchor="t" bIns="91425" lIns="91425" spcFirstLastPara="1" rIns="91425" wrap="square" tIns="91425">
+            <a:noAutofit/>
+          </a:bodyPr>
+          <a:lstStyle/>
+          <a:p>
+            <a:pPr indent="0" lvl="0" marL="0" rtl="0" algn="l">
+              <a:spcBef>
+                <a:spcPts val="0"/>
+              </a:spcBef>
+              <a:spcAft>
+                <a:spcPts val="0"/>
+              </a:spcAft>
+              <a:buNone/>
+            </a:pPr>
+            <a:r>
+              <a:rPr lang="en" sz="1000">
+                <a:solidFill>
+                  <a:srgbClr val="FA7815"/>
+                </a:solidFill>
+                <a:latin typeface="Roboto"/>
+                <a:ea typeface="Roboto"/>
+                <a:cs typeface="Roboto"/>
+                <a:sym typeface="Roboto"/>
+              </a:rPr>
+              <a:t>&lt;p&gt;</a:t>
+            </a:r>
+            <a:endParaRPr sz="1000">
+              <a:solidFill>
+                <a:srgbClr val="FA7815"/>
+              </a:solidFill>
+              <a:latin typeface="Roboto"/>
+              <a:ea typeface="Roboto"/>
+              <a:cs typeface="Roboto"/>
+              <a:sym typeface="Roboto"/>
+            </a:endParaRPr>
+          </a:p>
+        </p:txBody>
+      </p:sp>
+      <p:sp>
+        <p:nvSpPr>
+          <p:cNvPr id="192" name="Google Shape;192;p19"/>
+          <p:cNvSpPr txBox="1"/>
+          <p:nvPr/>
+        </p:nvSpPr>
+        <p:spPr>
+          <a:xfrm>
+            <a:off x="8161025" y="2629225"/>
+            <a:ext cx="618600" cy="305400"/>
+          </a:xfrm>
+          <a:prstGeom prst="rect">
+            <a:avLst/>
+          </a:prstGeom>
+          <a:noFill/>
+          <a:ln>
+            <a:noFill/>
+          </a:ln>
+        </p:spPr>
+        <p:txBody>
+          <a:bodyPr anchorCtr="0" anchor="t" bIns="91425" lIns="91425" spcFirstLastPara="1" rIns="91425" wrap="square" tIns="91425">
+            <a:noAutofit/>
+          </a:bodyPr>
+          <a:lstStyle/>
+          <a:p>
+            <a:pPr indent="0" lvl="0" marL="0" rtl="0" algn="l">
+              <a:spcBef>
+                <a:spcPts val="0"/>
+              </a:spcBef>
+              <a:spcAft>
+                <a:spcPts val="0"/>
+              </a:spcAft>
+              <a:buNone/>
+            </a:pPr>
+            <a:r>
+              <a:rPr lang="en" sz="1000">
+                <a:solidFill>
+                  <a:srgbClr val="FA7815"/>
+                </a:solidFill>
+                <a:latin typeface="Roboto"/>
+                <a:ea typeface="Roboto"/>
+                <a:cs typeface="Roboto"/>
+                <a:sym typeface="Roboto"/>
+              </a:rPr>
+              <a:t>&lt;p&gt;</a:t>
+            </a:r>
+            <a:endParaRPr sz="1000">
+              <a:solidFill>
+                <a:srgbClr val="FA7815"/>
+              </a:solidFill>
+              <a:latin typeface="Roboto"/>
+              <a:ea typeface="Roboto"/>
+              <a:cs typeface="Roboto"/>
+              <a:sym typeface="Roboto"/>
+            </a:endParaRPr>
+          </a:p>
+        </p:txBody>
+      </p:sp>
+      <p:sp>
+        <p:nvSpPr>
+          <p:cNvPr id="193" name="Google Shape;193;p19"/>
+          <p:cNvSpPr txBox="1"/>
+          <p:nvPr/>
+        </p:nvSpPr>
+        <p:spPr>
+          <a:xfrm>
+            <a:off x="6690375" y="2629225"/>
+            <a:ext cx="618600" cy="305400"/>
+          </a:xfrm>
+          <a:prstGeom prst="rect">
+            <a:avLst/>
+          </a:prstGeom>
+          <a:noFill/>
+          <a:ln>
+            <a:noFill/>
+          </a:ln>
+        </p:spPr>
+        <p:txBody>
+          <a:bodyPr anchorCtr="0" anchor="t" bIns="91425" lIns="91425" spcFirstLastPara="1" rIns="91425" wrap="square" tIns="91425">
+            <a:noAutofit/>
+          </a:bodyPr>
+          <a:lstStyle/>
+          <a:p>
+            <a:pPr indent="0" lvl="0" marL="0" rtl="0" algn="l">
+              <a:spcBef>
+                <a:spcPts val="0"/>
+              </a:spcBef>
+              <a:spcAft>
+                <a:spcPts val="0"/>
+              </a:spcAft>
+              <a:buNone/>
+            </a:pPr>
+            <a:r>
+              <a:rPr lang="en" sz="1000">
+                <a:solidFill>
+                  <a:srgbClr val="FA7815"/>
+                </a:solidFill>
+                <a:latin typeface="Roboto"/>
+                <a:ea typeface="Roboto"/>
+                <a:cs typeface="Roboto"/>
+                <a:sym typeface="Roboto"/>
+              </a:rPr>
+              <a:t>&lt;img&gt;</a:t>
+            </a:r>
+            <a:endParaRPr sz="1000">
+              <a:solidFill>
+                <a:srgbClr val="FA7815"/>
+              </a:solidFill>
+              <a:latin typeface="Roboto"/>
+              <a:ea typeface="Roboto"/>
+              <a:cs typeface="Roboto"/>
+              <a:sym typeface="Roboto"/>
+            </a:endParaRPr>
+          </a:p>
+        </p:txBody>
+      </p:sp>
+      <p:sp>
+        <p:nvSpPr>
+          <p:cNvPr id="194" name="Google Shape;194;p19"/>
+          <p:cNvSpPr txBox="1"/>
+          <p:nvPr/>
+        </p:nvSpPr>
+        <p:spPr>
+          <a:xfrm>
+            <a:off x="3948325" y="2629225"/>
+            <a:ext cx="618600" cy="305400"/>
+          </a:xfrm>
+          <a:prstGeom prst="rect">
+            <a:avLst/>
+          </a:prstGeom>
+          <a:noFill/>
+          <a:ln>
+            <a:noFill/>
+          </a:ln>
+        </p:spPr>
+        <p:txBody>
+          <a:bodyPr anchorCtr="0" anchor="t" bIns="91425" lIns="91425" spcFirstLastPara="1" rIns="91425" wrap="square" tIns="91425">
+            <a:noAutofit/>
+          </a:bodyPr>
+          <a:lstStyle/>
+          <a:p>
+            <a:pPr indent="0" lvl="0" marL="0" rtl="0" algn="l">
+              <a:spcBef>
+                <a:spcPts val="0"/>
+              </a:spcBef>
+              <a:spcAft>
+                <a:spcPts val="0"/>
+              </a:spcAft>
+              <a:buNone/>
+            </a:pPr>
+            <a:r>
+              <a:rPr lang="en" sz="1000">
+                <a:solidFill>
+                  <a:srgbClr val="FA7815"/>
+                </a:solidFill>
+                <a:latin typeface="Roboto"/>
+                <a:ea typeface="Roboto"/>
+                <a:cs typeface="Roboto"/>
+                <a:sym typeface="Roboto"/>
+              </a:rPr>
+              <a:t>&lt;img&gt;</a:t>
+            </a:r>
+            <a:endParaRPr sz="1000">
+              <a:solidFill>
+                <a:srgbClr val="FA7815"/>
+              </a:solidFill>
+              <a:latin typeface="Roboto"/>
+              <a:ea typeface="Roboto"/>
+              <a:cs typeface="Roboto"/>
+              <a:sym typeface="Roboto"/>
+            </a:endParaRPr>
+          </a:p>
+        </p:txBody>
+      </p:sp>
+      <p:sp>
+        <p:nvSpPr>
+          <p:cNvPr id="195" name="Google Shape;195;p19"/>
+          <p:cNvSpPr txBox="1"/>
+          <p:nvPr/>
+        </p:nvSpPr>
+        <p:spPr>
+          <a:xfrm>
+            <a:off x="7339875" y="4431675"/>
+            <a:ext cx="618600" cy="305400"/>
+          </a:xfrm>
+          <a:prstGeom prst="rect">
+            <a:avLst/>
+          </a:prstGeom>
+          <a:noFill/>
+          <a:ln>
+            <a:noFill/>
+          </a:ln>
+        </p:spPr>
+        <p:txBody>
+          <a:bodyPr anchorCtr="0" anchor="t" bIns="91425" lIns="91425" spcFirstLastPara="1" rIns="91425" wrap="square" tIns="91425">
+            <a:noAutofit/>
+          </a:bodyPr>
+          <a:lstStyle/>
+          <a:p>
+            <a:pPr indent="0" lvl="0" marL="0" rtl="0" algn="l">
+              <a:spcBef>
+                <a:spcPts val="0"/>
+              </a:spcBef>
+              <a:spcAft>
+                <a:spcPts val="0"/>
+              </a:spcAft>
+              <a:buNone/>
+            </a:pPr>
+            <a:r>
+              <a:rPr lang="en" sz="1000">
+                <a:solidFill>
+                  <a:srgbClr val="FA7815"/>
+                </a:solidFill>
+                <a:latin typeface="Roboto"/>
+                <a:ea typeface="Roboto"/>
+                <a:cs typeface="Roboto"/>
+                <a:sym typeface="Roboto"/>
+              </a:rPr>
+              <a:t>&lt;img&gt;</a:t>
+            </a:r>
+            <a:endParaRPr sz="1000">
+              <a:solidFill>
+                <a:srgbClr val="FA7815"/>
+              </a:solidFill>
+              <a:latin typeface="Roboto"/>
+              <a:ea typeface="Roboto"/>
+              <a:cs typeface="Roboto"/>
+              <a:sym typeface="Roboto"/>
+            </a:endParaRPr>
+          </a:p>
+        </p:txBody>
+      </p:sp>
+      <p:sp>
+        <p:nvSpPr>
+          <p:cNvPr id="196" name="Google Shape;196;p19"/>
+          <p:cNvSpPr txBox="1"/>
+          <p:nvPr/>
+        </p:nvSpPr>
+        <p:spPr>
+          <a:xfrm>
+            <a:off x="5266263" y="4431675"/>
+            <a:ext cx="618600" cy="305400"/>
+          </a:xfrm>
+          <a:prstGeom prst="rect">
+            <a:avLst/>
+          </a:prstGeom>
+          <a:noFill/>
+          <a:ln>
+            <a:noFill/>
+          </a:ln>
+        </p:spPr>
+        <p:txBody>
+          <a:bodyPr anchorCtr="0" anchor="t" bIns="91425" lIns="91425" spcFirstLastPara="1" rIns="91425" wrap="square" tIns="91425">
+            <a:noAutofit/>
+          </a:bodyPr>
+          <a:lstStyle/>
+          <a:p>
+            <a:pPr indent="0" lvl="0" marL="0" rtl="0" algn="l">
+              <a:spcBef>
+                <a:spcPts val="0"/>
+              </a:spcBef>
+              <a:spcAft>
+                <a:spcPts val="0"/>
+              </a:spcAft>
+              <a:buNone/>
+            </a:pPr>
+            <a:r>
+              <a:rPr lang="en" sz="1000">
+                <a:solidFill>
+                  <a:srgbClr val="FA7815"/>
+                </a:solidFill>
+                <a:latin typeface="Roboto"/>
+                <a:ea typeface="Roboto"/>
+                <a:cs typeface="Roboto"/>
+                <a:sym typeface="Roboto"/>
+              </a:rPr>
+              <a:t>&lt;img&gt;</a:t>
+            </a:r>
+            <a:endParaRPr sz="1000">
+              <a:solidFill>
+                <a:srgbClr val="FA7815"/>
+              </a:solidFill>
+              <a:latin typeface="Roboto"/>
+              <a:ea typeface="Roboto"/>
+              <a:cs typeface="Roboto"/>
+              <a:sym typeface="Roboto"/>
+            </a:endParaRPr>
+          </a:p>
+        </p:txBody>
+      </p:sp>
+      <p:sp>
+        <p:nvSpPr>
+          <p:cNvPr id="197" name="Google Shape;197;p19"/>
+          <p:cNvSpPr txBox="1"/>
+          <p:nvPr/>
+        </p:nvSpPr>
+        <p:spPr>
+          <a:xfrm>
+            <a:off x="3307975" y="4431675"/>
+            <a:ext cx="618600" cy="305400"/>
+          </a:xfrm>
+          <a:prstGeom prst="rect">
+            <a:avLst/>
+          </a:prstGeom>
+          <a:noFill/>
+          <a:ln>
+            <a:noFill/>
+          </a:ln>
+        </p:spPr>
+        <p:txBody>
+          <a:bodyPr anchorCtr="0" anchor="t" bIns="91425" lIns="91425" spcFirstLastPara="1" rIns="91425" wrap="square" tIns="91425">
+            <a:noAutofit/>
+          </a:bodyPr>
+          <a:lstStyle/>
+          <a:p>
+            <a:pPr indent="0" lvl="0" marL="0" rtl="0" algn="l">
+              <a:spcBef>
+                <a:spcPts val="0"/>
+              </a:spcBef>
+              <a:spcAft>
+                <a:spcPts val="0"/>
+              </a:spcAft>
+              <a:buNone/>
+            </a:pPr>
+            <a:r>
+              <a:rPr lang="en" sz="1000">
+                <a:solidFill>
+                  <a:srgbClr val="FA7815"/>
+                </a:solidFill>
+                <a:latin typeface="Roboto"/>
+                <a:ea typeface="Roboto"/>
+                <a:cs typeface="Roboto"/>
+                <a:sym typeface="Roboto"/>
+              </a:rPr>
+              <a:t>&lt;img&gt;</a:t>
+            </a:r>
+            <a:endParaRPr sz="1000">
+              <a:solidFill>
+                <a:srgbClr val="FA7815"/>
+              </a:solidFill>
+              <a:latin typeface="Roboto"/>
+              <a:ea typeface="Roboto"/>
+              <a:cs typeface="Roboto"/>
+              <a:sym typeface="Roboto"/>
+            </a:endParaRPr>
+          </a:p>
+        </p:txBody>
+      </p:sp>
+      <p:sp>
+        <p:nvSpPr>
+          <p:cNvPr id="198" name="Google Shape;198;p19"/>
+          <p:cNvSpPr txBox="1"/>
+          <p:nvPr/>
+        </p:nvSpPr>
+        <p:spPr>
+          <a:xfrm>
+            <a:off x="4402950" y="4431675"/>
+            <a:ext cx="618600" cy="305400"/>
+          </a:xfrm>
+          <a:prstGeom prst="rect">
+            <a:avLst/>
+          </a:prstGeom>
+          <a:noFill/>
+          <a:ln>
+            <a:noFill/>
+          </a:ln>
+        </p:spPr>
+        <p:txBody>
+          <a:bodyPr anchorCtr="0" anchor="t" bIns="91425" lIns="91425" spcFirstLastPara="1" rIns="91425" wrap="square" tIns="91425">
+            <a:noAutofit/>
+          </a:bodyPr>
+          <a:lstStyle/>
+          <a:p>
+            <a:pPr indent="0" lvl="0" marL="0" rtl="0" algn="l">
+              <a:spcBef>
+                <a:spcPts val="0"/>
+              </a:spcBef>
+              <a:spcAft>
+                <a:spcPts val="0"/>
+              </a:spcAft>
+              <a:buNone/>
+            </a:pPr>
+            <a:r>
+              <a:rPr lang="en" sz="1000">
+                <a:solidFill>
+                  <a:srgbClr val="FA7815"/>
+                </a:solidFill>
+                <a:latin typeface="Roboto"/>
+                <a:ea typeface="Roboto"/>
+                <a:cs typeface="Roboto"/>
+                <a:sym typeface="Roboto"/>
+              </a:rPr>
+              <a:t>&lt;p&gt;</a:t>
+            </a:r>
+            <a:endParaRPr sz="1000">
+              <a:solidFill>
+                <a:srgbClr val="FA7815"/>
+              </a:solidFill>
+              <a:latin typeface="Roboto"/>
+              <a:ea typeface="Roboto"/>
+              <a:cs typeface="Roboto"/>
+              <a:sym typeface="Roboto"/>
+            </a:endParaRPr>
+          </a:p>
+        </p:txBody>
+      </p:sp>
+      <p:sp>
+        <p:nvSpPr>
+          <p:cNvPr id="199" name="Google Shape;199;p19"/>
+          <p:cNvSpPr txBox="1"/>
+          <p:nvPr/>
+        </p:nvSpPr>
+        <p:spPr>
+          <a:xfrm>
+            <a:off x="6205788" y="4431675"/>
+            <a:ext cx="618600" cy="305400"/>
+          </a:xfrm>
+          <a:prstGeom prst="rect">
+            <a:avLst/>
+          </a:prstGeom>
+          <a:noFill/>
+          <a:ln>
+            <a:noFill/>
+          </a:ln>
+        </p:spPr>
+        <p:txBody>
+          <a:bodyPr anchorCtr="0" anchor="t" bIns="91425" lIns="91425" spcFirstLastPara="1" rIns="91425" wrap="square" tIns="91425">
+            <a:noAutofit/>
+          </a:bodyPr>
+          <a:lstStyle/>
+          <a:p>
+            <a:pPr indent="0" lvl="0" marL="0" rtl="0" algn="l">
+              <a:spcBef>
+                <a:spcPts val="0"/>
+              </a:spcBef>
+              <a:spcAft>
+                <a:spcPts val="0"/>
+              </a:spcAft>
+              <a:buNone/>
+            </a:pPr>
+            <a:r>
+              <a:rPr lang="en" sz="1000">
+                <a:solidFill>
+                  <a:srgbClr val="FA7815"/>
+                </a:solidFill>
+                <a:latin typeface="Roboto"/>
+                <a:ea typeface="Roboto"/>
+                <a:cs typeface="Roboto"/>
+                <a:sym typeface="Roboto"/>
+              </a:rPr>
+              <a:t>&lt;p&gt;</a:t>
+            </a:r>
+            <a:endParaRPr sz="1000">
+              <a:solidFill>
+                <a:srgbClr val="FA7815"/>
+              </a:solidFill>
+              <a:latin typeface="Roboto"/>
+              <a:ea typeface="Roboto"/>
+              <a:cs typeface="Roboto"/>
+              <a:sym typeface="Roboto"/>
+            </a:endParaRPr>
+          </a:p>
+        </p:txBody>
+      </p:sp>
+      <p:sp>
+        <p:nvSpPr>
+          <p:cNvPr id="200" name="Google Shape;200;p19"/>
+          <p:cNvSpPr txBox="1"/>
+          <p:nvPr/>
+        </p:nvSpPr>
+        <p:spPr>
+          <a:xfrm>
+            <a:off x="8084800" y="4431675"/>
+            <a:ext cx="618600" cy="305400"/>
+          </a:xfrm>
+          <a:prstGeom prst="rect">
+            <a:avLst/>
+          </a:prstGeom>
+          <a:noFill/>
+          <a:ln>
+            <a:noFill/>
+          </a:ln>
+        </p:spPr>
+        <p:txBody>
+          <a:bodyPr anchorCtr="0" anchor="t" bIns="91425" lIns="91425" spcFirstLastPara="1" rIns="91425" wrap="square" tIns="91425">
+            <a:noAutofit/>
+          </a:bodyPr>
+          <a:lstStyle/>
+          <a:p>
+            <a:pPr indent="0" lvl="0" marL="0" rtl="0" algn="l">
+              <a:spcBef>
+                <a:spcPts val="0"/>
+              </a:spcBef>
+              <a:spcAft>
+                <a:spcPts val="0"/>
+              </a:spcAft>
+              <a:buNone/>
+            </a:pPr>
+            <a:r>
+              <a:rPr lang="en" sz="1000">
+                <a:solidFill>
+                  <a:srgbClr val="FA7815"/>
+                </a:solidFill>
+                <a:latin typeface="Roboto"/>
+                <a:ea typeface="Roboto"/>
+                <a:cs typeface="Roboto"/>
+                <a:sym typeface="Roboto"/>
+              </a:rPr>
+              <a:t>&lt;p&gt;</a:t>
+            </a:r>
+            <a:endParaRPr sz="1000">
+              <a:solidFill>
+                <a:srgbClr val="FA7815"/>
+              </a:solidFill>
+              <a:latin typeface="Roboto"/>
+              <a:ea typeface="Roboto"/>
+              <a:cs typeface="Roboto"/>
+              <a:sym typeface="Roboto"/>
+            </a:endParaRPr>
+          </a:p>
+        </p:txBody>
+      </p:sp>
+      <p:sp>
+        <p:nvSpPr>
+          <p:cNvPr id="201" name="Google Shape;201;p19"/>
+          <p:cNvSpPr txBox="1"/>
+          <p:nvPr/>
+        </p:nvSpPr>
+        <p:spPr>
+          <a:xfrm>
+            <a:off x="5059675" y="977475"/>
+            <a:ext cx="999000" cy="305400"/>
+          </a:xfrm>
+          <a:prstGeom prst="rect">
+            <a:avLst/>
+          </a:prstGeom>
+          <a:noFill/>
+          <a:ln>
+            <a:noFill/>
+          </a:ln>
+        </p:spPr>
+        <p:txBody>
+          <a:bodyPr anchorCtr="0" anchor="t" bIns="91425" lIns="91425" spcFirstLastPara="1" rIns="91425" wrap="square" tIns="91425">
+            <a:noAutofit/>
+          </a:bodyPr>
+          <a:lstStyle/>
+          <a:p>
+            <a:pPr indent="0" lvl="0" marL="0" rtl="0" algn="l">
+              <a:spcBef>
+                <a:spcPts val="0"/>
+              </a:spcBef>
+              <a:spcAft>
+                <a:spcPts val="0"/>
+              </a:spcAft>
+              <a:buNone/>
+            </a:pPr>
+            <a:r>
+              <a:rPr lang="en" sz="1000">
+                <a:solidFill>
+                  <a:srgbClr val="FA7815"/>
+                </a:solidFill>
+                <a:latin typeface="Roboto"/>
+                <a:ea typeface="Roboto"/>
+                <a:cs typeface="Roboto"/>
+                <a:sym typeface="Roboto"/>
+              </a:rPr>
+              <a:t>&lt;ul&gt;&lt;li&gt;&lt;a&gt;</a:t>
+            </a:r>
+            <a:endParaRPr sz="1000">
+              <a:solidFill>
+                <a:srgbClr val="FA7815"/>
+              </a:solidFill>
+              <a:latin typeface="Roboto"/>
+              <a:ea typeface="Roboto"/>
+              <a:cs typeface="Roboto"/>
+              <a:sym typeface="Roboto"/>
+            </a:endParaRPr>
+          </a:p>
+        </p:txBody>
+      </p:sp>
+      <p:sp>
+        <p:nvSpPr>
+          <p:cNvPr id="202" name="Google Shape;202;p19"/>
+          <p:cNvSpPr txBox="1"/>
+          <p:nvPr/>
+        </p:nvSpPr>
+        <p:spPr>
+          <a:xfrm>
+            <a:off x="3107700" y="887350"/>
+            <a:ext cx="618600" cy="305400"/>
+          </a:xfrm>
+          <a:prstGeom prst="rect">
+            <a:avLst/>
+          </a:prstGeom>
+          <a:noFill/>
+          <a:ln>
+            <a:noFill/>
+          </a:ln>
+        </p:spPr>
+        <p:txBody>
+          <a:bodyPr anchorCtr="0" anchor="t" bIns="91425" lIns="91425" spcFirstLastPara="1" rIns="91425" wrap="square" tIns="91425">
+            <a:noAutofit/>
+          </a:bodyPr>
+          <a:lstStyle/>
+          <a:p>
+            <a:pPr indent="0" lvl="0" marL="0" rtl="0" algn="l">
+              <a:spcBef>
+                <a:spcPts val="0"/>
+              </a:spcBef>
+              <a:spcAft>
+                <a:spcPts val="0"/>
+              </a:spcAft>
+              <a:buNone/>
+            </a:pPr>
+            <a:r>
+              <a:rPr lang="en" sz="1000">
+                <a:solidFill>
+                  <a:srgbClr val="FA7815"/>
+                </a:solidFill>
+                <a:latin typeface="Roboto"/>
+                <a:ea typeface="Roboto"/>
+                <a:cs typeface="Roboto"/>
+                <a:sym typeface="Roboto"/>
+              </a:rPr>
+              <a:t>&lt;img&gt;</a:t>
+            </a:r>
+            <a:endParaRPr sz="1000">
+              <a:solidFill>
+                <a:srgbClr val="FA7815"/>
+              </a:solidFill>
+              <a:latin typeface="Roboto"/>
+              <a:ea typeface="Roboto"/>
+              <a:cs typeface="Roboto"/>
+              <a:sym typeface="Roboto"/>
+            </a:endParaRPr>
+          </a:p>
+        </p:txBody>
+      </p:sp>
+      <p:sp>
+        <p:nvSpPr>
+          <p:cNvPr id="203" name="Google Shape;203;p19"/>
+          <p:cNvSpPr txBox="1"/>
+          <p:nvPr/>
+        </p:nvSpPr>
+        <p:spPr>
+          <a:xfrm>
+            <a:off x="7542425" y="3147375"/>
+            <a:ext cx="999000" cy="305400"/>
+          </a:xfrm>
+          <a:prstGeom prst="rect">
+            <a:avLst/>
+          </a:prstGeom>
+          <a:noFill/>
+          <a:ln>
+            <a:noFill/>
+          </a:ln>
+        </p:spPr>
+        <p:txBody>
+          <a:bodyPr anchorCtr="0" anchor="t" bIns="91425" lIns="91425" spcFirstLastPara="1" rIns="91425" wrap="square" tIns="91425">
+            <a:noAutofit/>
+          </a:bodyPr>
+          <a:lstStyle/>
+          <a:p>
+            <a:pPr indent="0" lvl="0" marL="0" rtl="0" algn="l">
+              <a:spcBef>
+                <a:spcPts val="0"/>
+              </a:spcBef>
+              <a:spcAft>
+                <a:spcPts val="0"/>
+              </a:spcAft>
+              <a:buNone/>
+            </a:pPr>
+            <a:r>
+              <a:rPr lang="en" sz="1000">
+                <a:solidFill>
+                  <a:srgbClr val="FA7815"/>
+                </a:solidFill>
+                <a:latin typeface="Roboto"/>
+                <a:ea typeface="Roboto"/>
+                <a:cs typeface="Roboto"/>
+                <a:sym typeface="Roboto"/>
+              </a:rPr>
+              <a:t>&lt;section&gt;</a:t>
+            </a:r>
+            <a:endParaRPr sz="1000">
+              <a:solidFill>
+                <a:srgbClr val="FA7815"/>
+              </a:solidFill>
+              <a:latin typeface="Roboto"/>
+              <a:ea typeface="Roboto"/>
+              <a:cs typeface="Roboto"/>
+              <a:sym typeface="Roboto"/>
+            </a:endParaRPr>
+          </a:p>
+        </p:txBody>
+      </p:sp>
+      <p:sp>
+        <p:nvSpPr>
+          <p:cNvPr id="204" name="Google Shape;204;p19"/>
+          <p:cNvSpPr txBox="1"/>
+          <p:nvPr/>
+        </p:nvSpPr>
+        <p:spPr>
+          <a:xfrm>
+            <a:off x="7308975" y="1387175"/>
+            <a:ext cx="999000" cy="305400"/>
+          </a:xfrm>
+          <a:prstGeom prst="rect">
+            <a:avLst/>
+          </a:prstGeom>
+          <a:noFill/>
+          <a:ln>
+            <a:noFill/>
+          </a:ln>
+        </p:spPr>
+        <p:txBody>
+          <a:bodyPr anchorCtr="0" anchor="t" bIns="91425" lIns="91425" spcFirstLastPara="1" rIns="91425" wrap="square" tIns="91425">
+            <a:noAutofit/>
+          </a:bodyPr>
+          <a:lstStyle/>
+          <a:p>
+            <a:pPr indent="0" lvl="0" marL="0" rtl="0" algn="l">
+              <a:spcBef>
+                <a:spcPts val="0"/>
+              </a:spcBef>
+              <a:spcAft>
+                <a:spcPts val="0"/>
+              </a:spcAft>
+              <a:buNone/>
+            </a:pPr>
+            <a:r>
+              <a:rPr lang="en" sz="1000">
+                <a:solidFill>
+                  <a:srgbClr val="FA7815"/>
+                </a:solidFill>
+                <a:latin typeface="Roboto"/>
+                <a:ea typeface="Roboto"/>
+                <a:cs typeface="Roboto"/>
+                <a:sym typeface="Roboto"/>
+              </a:rPr>
+              <a:t>&lt;section&gt;</a:t>
+            </a:r>
+            <a:endParaRPr sz="1000">
+              <a:solidFill>
+                <a:srgbClr val="FA7815"/>
+              </a:solidFill>
+              <a:latin typeface="Roboto"/>
+              <a:ea typeface="Roboto"/>
+              <a:cs typeface="Roboto"/>
+              <a:sym typeface="Roboto"/>
+            </a:endParaRPr>
+          </a:p>
+        </p:txBody>
+      </p:sp>
     </p:spTree>
   </p:cSld>
   <p:clrMapOvr>
@@ -12556,6 +14604,285 @@
 </file>
 
 <file path=ppt/theme/theme1.xml><?xml version="1.0" encoding="utf-8"?>
+<a:theme xmlns:a="http://schemas.openxmlformats.org/drawingml/2006/main" xmlns:r="http://schemas.openxmlformats.org/officeDocument/2006/relationships" name="Simple Light">
+  <a:themeElements>
+    <a:clrScheme name="Simple Light">
+      <a:dk1>
+        <a:srgbClr val="000000"/>
+      </a:dk1>
+      <a:lt1>
+        <a:srgbClr val="FFFFFF"/>
+      </a:lt1>
+      <a:dk2>
+        <a:srgbClr val="595959"/>
+      </a:dk2>
+      <a:lt2>
+        <a:srgbClr val="EEEEEE"/>
+      </a:lt2>
+      <a:accent1>
+        <a:srgbClr val="FFAB40"/>
+      </a:accent1>
+      <a:accent2>
+        <a:srgbClr val="212121"/>
+      </a:accent2>
+      <a:accent3>
+        <a:srgbClr val="78909C"/>
+      </a:accent3>
+      <a:accent4>
+        <a:srgbClr val="FFAB40"/>
+      </a:accent4>
+      <a:accent5>
+        <a:srgbClr val="0097A7"/>
+      </a:accent5>
+      <a:accent6>
+        <a:srgbClr val="EEFF41"/>
+      </a:accent6>
+      <a:hlink>
+        <a:srgbClr val="0097A7"/>
+      </a:hlink>
+      <a:folHlink>
+        <a:srgbClr val="0097A7"/>
+      </a:folHlink>
+    </a:clrScheme>
+    <a:fontScheme name="Office">
+      <a:majorFont>
+        <a:latin typeface="Arial"/>
+        <a:ea typeface=""/>
+        <a:cs typeface=""/>
+        <a:font script="Jpan" typeface="ＭＳ Ｐゴシック"/>
+        <a:font script="Hang" typeface="맑은 고딕"/>
+        <a:font script="Hans" typeface="宋体"/>
+        <a:font script="Hant" typeface="新細明體"/>
+        <a:font script="Arab" typeface="Times New Roman"/>
+        <a:font script="Hebr" typeface="Times New Roman"/>
+        <a:font script="Thai" typeface="Angsana New"/>
+        <a:font script="Ethi" typeface="Nyala"/>
+        <a:font script="Beng" typeface="Vrinda"/>
+        <a:font script="Gujr" typeface="Shruti"/>
+        <a:font script="Khmr" typeface="MoolBoran"/>
+        <a:font script="Knda" typeface="Tunga"/>
+        <a:font script="Guru" typeface="Raavi"/>
+        <a:font script="Cans" typeface="Euphemia"/>
+        <a:font script="Cher" typeface="Plantagenet Cherokee"/>
+        <a:font script="Yiii" typeface="Microsoft Yi Baiti"/>
+        <a:font script="Tibt" typeface="Microsoft Himalaya"/>
+        <a:font script="Thaa" typeface="MV Boli"/>
+        <a:font script="Deva" typeface="Mangal"/>
+        <a:font script="Telu" typeface="Gautami"/>
+        <a:font script="Taml" typeface="Latha"/>
+        <a:font script="Syrc" typeface="Estrangelo Edessa"/>
+        <a:font script="Orya" typeface="Kalinga"/>
+        <a:font script="Mlym" typeface="Kartika"/>
+        <a:font script="Laoo" typeface="DokChampa"/>
+        <a:font script="Sinh" typeface="Iskoola Pota"/>
+        <a:font script="Mong" typeface="Mongolian Baiti"/>
+        <a:font script="Viet" typeface="Times New Roman"/>
+        <a:font script="Uigh" typeface="Microsoft Uighur"/>
+        <a:font script="Geor" typeface="Sylfaen"/>
+      </a:majorFont>
+      <a:minorFont>
+        <a:latin typeface="Arial"/>
+        <a:ea typeface=""/>
+        <a:cs typeface=""/>
+        <a:font script="Jpan" typeface="ＭＳ Ｐゴシック"/>
+        <a:font script="Hang" typeface="맑은 고딕"/>
+        <a:font script="Hans" typeface="宋体"/>
+        <a:font script="Hant" typeface="新細明體"/>
+        <a:font script="Arab" typeface="Arial"/>
+        <a:font script="Hebr" typeface="Arial"/>
+        <a:font script="Thai" typeface="Cordia New"/>
+        <a:font script="Ethi" typeface="Nyala"/>
+        <a:font script="Beng" typeface="Vrinda"/>
+        <a:font script="Gujr" typeface="Shruti"/>
+        <a:font script="Khmr" typeface="DaunPenh"/>
+        <a:font script="Knda" typeface="Tunga"/>
+        <a:font script="Guru" typeface="Raavi"/>
+        <a:font script="Cans" typeface="Euphemia"/>
+        <a:font script="Cher" typeface="Plantagenet Cherokee"/>
+        <a:font script="Yiii" typeface="Microsoft Yi Baiti"/>
+        <a:font script="Tibt" typeface="Microsoft Himalaya"/>
+        <a:font script="Thaa" typeface="MV Boli"/>
+        <a:font script="Deva" typeface="Mangal"/>
+        <a:font script="Telu" typeface="Gautami"/>
+        <a:font script="Taml" typeface="Latha"/>
+        <a:font script="Syrc" typeface="Estrangelo Edessa"/>
+        <a:font script="Orya" typeface="Kalinga"/>
+        <a:font script="Mlym" typeface="Kartika"/>
+        <a:font script="Laoo" typeface="DokChampa"/>
+        <a:font script="Sinh" typeface="Iskoola Pota"/>
+        <a:font script="Mong" typeface="Mongolian Baiti"/>
+        <a:font script="Viet" typeface="Arial"/>
+        <a:font script="Uigh" typeface="Microsoft Uighur"/>
+        <a:font script="Geor" typeface="Sylfaen"/>
+      </a:minorFont>
+    </a:fontScheme>
+    <a:fmtScheme name="Office">
+      <a:fillStyleLst>
+        <a:solidFill>
+          <a:schemeClr val="phClr"/>
+        </a:solidFill>
+        <a:gradFill rotWithShape="1">
+          <a:gsLst>
+            <a:gs pos="0">
+              <a:schemeClr val="phClr">
+                <a:tint val="50000"/>
+                <a:satMod val="300000"/>
+              </a:schemeClr>
+            </a:gs>
+            <a:gs pos="35000">
+              <a:schemeClr val="phClr">
+                <a:tint val="37000"/>
+                <a:satMod val="300000"/>
+              </a:schemeClr>
+            </a:gs>
+            <a:gs pos="100000">
+              <a:schemeClr val="phClr">
+                <a:tint val="15000"/>
+                <a:satMod val="350000"/>
+              </a:schemeClr>
+            </a:gs>
+          </a:gsLst>
+          <a:lin ang="16200000" scaled="1"/>
+        </a:gradFill>
+        <a:gradFill rotWithShape="1">
+          <a:gsLst>
+            <a:gs pos="0">
+              <a:schemeClr val="phClr">
+                <a:tint val="100000"/>
+                <a:shade val="100000"/>
+                <a:satMod val="130000"/>
+              </a:schemeClr>
+            </a:gs>
+            <a:gs pos="100000">
+              <a:schemeClr val="phClr">
+                <a:tint val="50000"/>
+                <a:shade val="100000"/>
+                <a:satMod val="350000"/>
+              </a:schemeClr>
+            </a:gs>
+          </a:gsLst>
+          <a:lin ang="16200000" scaled="0"/>
+        </a:gradFill>
+      </a:fillStyleLst>
+      <a:lnStyleLst>
+        <a:ln w="9525" cap="flat" cmpd="sng" algn="ctr">
+          <a:solidFill>
+            <a:schemeClr val="phClr">
+              <a:shade val="95000"/>
+              <a:satMod val="105000"/>
+            </a:schemeClr>
+          </a:solidFill>
+          <a:prstDash val="solid"/>
+        </a:ln>
+        <a:ln w="25400" cap="flat" cmpd="sng" algn="ctr">
+          <a:solidFill>
+            <a:schemeClr val="phClr"/>
+          </a:solidFill>
+          <a:prstDash val="solid"/>
+        </a:ln>
+        <a:ln w="38100" cap="flat" cmpd="sng" algn="ctr">
+          <a:solidFill>
+            <a:schemeClr val="phClr"/>
+          </a:solidFill>
+          <a:prstDash val="solid"/>
+        </a:ln>
+      </a:lnStyleLst>
+      <a:effectStyleLst>
+        <a:effectStyle>
+          <a:effectLst>
+            <a:outerShdw blurRad="40000" dist="20000" dir="5400000" rotWithShape="0">
+              <a:srgbClr val="000000">
+                <a:alpha val="38000"/>
+              </a:srgbClr>
+            </a:outerShdw>
+          </a:effectLst>
+        </a:effectStyle>
+        <a:effectStyle>
+          <a:effectLst>
+            <a:outerShdw blurRad="40000" dist="23000" dir="5400000" rotWithShape="0">
+              <a:srgbClr val="000000">
+                <a:alpha val="35000"/>
+              </a:srgbClr>
+            </a:outerShdw>
+          </a:effectLst>
+        </a:effectStyle>
+        <a:effectStyle>
+          <a:effectLst>
+            <a:outerShdw blurRad="40000" dist="23000" dir="5400000" rotWithShape="0">
+              <a:srgbClr val="000000">
+                <a:alpha val="35000"/>
+              </a:srgbClr>
+            </a:outerShdw>
+          </a:effectLst>
+          <a:scene3d>
+            <a:camera prst="orthographicFront">
+              <a:rot lat="0" lon="0" rev="0"/>
+            </a:camera>
+            <a:lightRig rig="threePt" dir="t">
+              <a:rot lat="0" lon="0" rev="1200000"/>
+            </a:lightRig>
+          </a:scene3d>
+          <a:sp3d>
+            <a:bevelT w="63500" h="25400"/>
+          </a:sp3d>
+        </a:effectStyle>
+      </a:effectStyleLst>
+      <a:bgFillStyleLst>
+        <a:solidFill>
+          <a:schemeClr val="phClr"/>
+        </a:solidFill>
+        <a:gradFill rotWithShape="1">
+          <a:gsLst>
+            <a:gs pos="0">
+              <a:schemeClr val="phClr">
+                <a:tint val="40000"/>
+                <a:satMod val="350000"/>
+              </a:schemeClr>
+            </a:gs>
+            <a:gs pos="40000">
+              <a:schemeClr val="phClr">
+                <a:tint val="45000"/>
+                <a:shade val="99000"/>
+                <a:satMod val="350000"/>
+              </a:schemeClr>
+            </a:gs>
+            <a:gs pos="100000">
+              <a:schemeClr val="phClr">
+                <a:shade val="20000"/>
+                <a:satMod val="255000"/>
+              </a:schemeClr>
+            </a:gs>
+          </a:gsLst>
+          <a:path path="circle">
+            <a:fillToRect l="50000" t="-80000" r="50000" b="180000"/>
+          </a:path>
+        </a:gradFill>
+        <a:gradFill rotWithShape="1">
+          <a:gsLst>
+            <a:gs pos="0">
+              <a:schemeClr val="phClr">
+                <a:tint val="80000"/>
+                <a:satMod val="300000"/>
+              </a:schemeClr>
+            </a:gs>
+            <a:gs pos="100000">
+              <a:schemeClr val="phClr">
+                <a:shade val="30000"/>
+                <a:satMod val="200000"/>
+              </a:schemeClr>
+            </a:gs>
+          </a:gsLst>
+          <a:path path="circle">
+            <a:fillToRect l="50000" t="50000" r="50000" b="50000"/>
+          </a:path>
+        </a:gradFill>
+      </a:bgFillStyleLst>
+    </a:fmtScheme>
+  </a:themeElements>
+</a:theme>
+</file>
+
+<file path=ppt/theme/theme2.xml><?xml version="1.0" encoding="utf-8"?>
 <a:theme xmlns:a="http://schemas.openxmlformats.org/drawingml/2006/main" xmlns:r="http://schemas.openxmlformats.org/officeDocument/2006/relationships">
   <a:themeElements>
     <a:clrScheme name="Default">
@@ -12832,283 +15159,4 @@
     </a:fmtScheme>
   </a:themeElements>
 </a:theme>
-</file>
-
-<file path=ppt/theme/theme2.xml><?xml version="1.0" encoding="utf-8"?>
-<a:theme xmlns:a="http://schemas.openxmlformats.org/drawingml/2006/main" xmlns:r="http://schemas.openxmlformats.org/officeDocument/2006/relationships" name="Simple Light">
-  <a:themeElements>
-    <a:clrScheme name="Simple Light">
-      <a:dk1>
-        <a:srgbClr val="000000"/>
-      </a:dk1>
-      <a:lt1>
-        <a:srgbClr val="FFFFFF"/>
-      </a:lt1>
-      <a:dk2>
-        <a:srgbClr val="595959"/>
-      </a:dk2>
-      <a:lt2>
-        <a:srgbClr val="EEEEEE"/>
-      </a:lt2>
-      <a:accent1>
-        <a:srgbClr val="FFAB40"/>
-      </a:accent1>
-      <a:accent2>
-        <a:srgbClr val="212121"/>
-      </a:accent2>
-      <a:accent3>
-        <a:srgbClr val="78909C"/>
-      </a:accent3>
-      <a:accent4>
-        <a:srgbClr val="FFAB40"/>
-      </a:accent4>
-      <a:accent5>
-        <a:srgbClr val="0097A7"/>
-      </a:accent5>
-      <a:accent6>
-        <a:srgbClr val="EEFF41"/>
-      </a:accent6>
-      <a:hlink>
-        <a:srgbClr val="0097A7"/>
-      </a:hlink>
-      <a:folHlink>
-        <a:srgbClr val="0097A7"/>
-      </a:folHlink>
-    </a:clrScheme>
-    <a:fontScheme name="Office">
-      <a:majorFont>
-        <a:latin typeface="Arial"/>
-        <a:ea typeface=""/>
-        <a:cs typeface=""/>
-        <a:font script="Jpan" typeface="ＭＳ Ｐゴシック"/>
-        <a:font script="Hang" typeface="맑은 고딕"/>
-        <a:font script="Hans" typeface="宋体"/>
-        <a:font script="Hant" typeface="新細明體"/>
-        <a:font script="Arab" typeface="Times New Roman"/>
-        <a:font script="Hebr" typeface="Times New Roman"/>
-        <a:font script="Thai" typeface="Angsana New"/>
-        <a:font script="Ethi" typeface="Nyala"/>
-        <a:font script="Beng" typeface="Vrinda"/>
-        <a:font script="Gujr" typeface="Shruti"/>
-        <a:font script="Khmr" typeface="MoolBoran"/>
-        <a:font script="Knda" typeface="Tunga"/>
-        <a:font script="Guru" typeface="Raavi"/>
-        <a:font script="Cans" typeface="Euphemia"/>
-        <a:font script="Cher" typeface="Plantagenet Cherokee"/>
-        <a:font script="Yiii" typeface="Microsoft Yi Baiti"/>
-        <a:font script="Tibt" typeface="Microsoft Himalaya"/>
-        <a:font script="Thaa" typeface="MV Boli"/>
-        <a:font script="Deva" typeface="Mangal"/>
-        <a:font script="Telu" typeface="Gautami"/>
-        <a:font script="Taml" typeface="Latha"/>
-        <a:font script="Syrc" typeface="Estrangelo Edessa"/>
-        <a:font script="Orya" typeface="Kalinga"/>
-        <a:font script="Mlym" typeface="Kartika"/>
-        <a:font script="Laoo" typeface="DokChampa"/>
-        <a:font script="Sinh" typeface="Iskoola Pota"/>
-        <a:font script="Mong" typeface="Mongolian Baiti"/>
-        <a:font script="Viet" typeface="Times New Roman"/>
-        <a:font script="Uigh" typeface="Microsoft Uighur"/>
-        <a:font script="Geor" typeface="Sylfaen"/>
-      </a:majorFont>
-      <a:minorFont>
-        <a:latin typeface="Arial"/>
-        <a:ea typeface=""/>
-        <a:cs typeface=""/>
-        <a:font script="Jpan" typeface="ＭＳ Ｐゴシック"/>
-        <a:font script="Hang" typeface="맑은 고딕"/>
-        <a:font script="Hans" typeface="宋体"/>
-        <a:font script="Hant" typeface="新細明體"/>
-        <a:font script="Arab" typeface="Arial"/>
-        <a:font script="Hebr" typeface="Arial"/>
-        <a:font script="Thai" typeface="Cordia New"/>
-        <a:font script="Ethi" typeface="Nyala"/>
-        <a:font script="Beng" typeface="Vrinda"/>
-        <a:font script="Gujr" typeface="Shruti"/>
-        <a:font script="Khmr" typeface="DaunPenh"/>
-        <a:font script="Knda" typeface="Tunga"/>
-        <a:font script="Guru" typeface="Raavi"/>
-        <a:font script="Cans" typeface="Euphemia"/>
-        <a:font script="Cher" typeface="Plantagenet Cherokee"/>
-        <a:font script="Yiii" typeface="Microsoft Yi Baiti"/>
-        <a:font script="Tibt" typeface="Microsoft Himalaya"/>
-        <a:font script="Thaa" typeface="MV Boli"/>
-        <a:font script="Deva" typeface="Mangal"/>
-        <a:font script="Telu" typeface="Gautami"/>
-        <a:font script="Taml" typeface="Latha"/>
-        <a:font script="Syrc" typeface="Estrangelo Edessa"/>
-        <a:font script="Orya" typeface="Kalinga"/>
-        <a:font script="Mlym" typeface="Kartika"/>
-        <a:font script="Laoo" typeface="DokChampa"/>
-        <a:font script="Sinh" typeface="Iskoola Pota"/>
-        <a:font script="Mong" typeface="Mongolian Baiti"/>
-        <a:font script="Viet" typeface="Arial"/>
-        <a:font script="Uigh" typeface="Microsoft Uighur"/>
-        <a:font script="Geor" typeface="Sylfaen"/>
-      </a:minorFont>
-    </a:fontScheme>
-    <a:fmtScheme name="Office">
-      <a:fillStyleLst>
-        <a:solidFill>
-          <a:schemeClr val="phClr"/>
-        </a:solidFill>
-        <a:gradFill rotWithShape="1">
-          <a:gsLst>
-            <a:gs pos="0">
-              <a:schemeClr val="phClr">
-                <a:tint val="50000"/>
-                <a:satMod val="300000"/>
-              </a:schemeClr>
-            </a:gs>
-            <a:gs pos="35000">
-              <a:schemeClr val="phClr">
-                <a:tint val="37000"/>
-                <a:satMod val="300000"/>
-              </a:schemeClr>
-            </a:gs>
-            <a:gs pos="100000">
-              <a:schemeClr val="phClr">
-                <a:tint val="15000"/>
-                <a:satMod val="350000"/>
-              </a:schemeClr>
-            </a:gs>
-          </a:gsLst>
-          <a:lin ang="16200000" scaled="1"/>
-        </a:gradFill>
-        <a:gradFill rotWithShape="1">
-          <a:gsLst>
-            <a:gs pos="0">
-              <a:schemeClr val="phClr">
-                <a:tint val="100000"/>
-                <a:shade val="100000"/>
-                <a:satMod val="130000"/>
-              </a:schemeClr>
-            </a:gs>
-            <a:gs pos="100000">
-              <a:schemeClr val="phClr">
-                <a:tint val="50000"/>
-                <a:shade val="100000"/>
-                <a:satMod val="350000"/>
-              </a:schemeClr>
-            </a:gs>
-          </a:gsLst>
-          <a:lin ang="16200000" scaled="0"/>
-        </a:gradFill>
-      </a:fillStyleLst>
-      <a:lnStyleLst>
-        <a:ln w="9525" cap="flat" cmpd="sng" algn="ctr">
-          <a:solidFill>
-            <a:schemeClr val="phClr">
-              <a:shade val="95000"/>
-              <a:satMod val="105000"/>
-            </a:schemeClr>
-          </a:solidFill>
-          <a:prstDash val="solid"/>
-        </a:ln>
-        <a:ln w="25400" cap="flat" cmpd="sng" algn="ctr">
-          <a:solidFill>
-            <a:schemeClr val="phClr"/>
-          </a:solidFill>
-          <a:prstDash val="solid"/>
-        </a:ln>
-        <a:ln w="38100" cap="flat" cmpd="sng" algn="ctr">
-          <a:solidFill>
-            <a:schemeClr val="phClr"/>
-          </a:solidFill>
-          <a:prstDash val="solid"/>
-        </a:ln>
-      </a:lnStyleLst>
-      <a:effectStyleLst>
-        <a:effectStyle>
-          <a:effectLst>
-            <a:outerShdw blurRad="40000" dist="20000" dir="5400000" rotWithShape="0">
-              <a:srgbClr val="000000">
-                <a:alpha val="38000"/>
-              </a:srgbClr>
-            </a:outerShdw>
-          </a:effectLst>
-        </a:effectStyle>
-        <a:effectStyle>
-          <a:effectLst>
-            <a:outerShdw blurRad="40000" dist="23000" dir="5400000" rotWithShape="0">
-              <a:srgbClr val="000000">
-                <a:alpha val="35000"/>
-              </a:srgbClr>
-            </a:outerShdw>
-          </a:effectLst>
-        </a:effectStyle>
-        <a:effectStyle>
-          <a:effectLst>
-            <a:outerShdw blurRad="40000" dist="23000" dir="5400000" rotWithShape="0">
-              <a:srgbClr val="000000">
-                <a:alpha val="35000"/>
-              </a:srgbClr>
-            </a:outerShdw>
-          </a:effectLst>
-          <a:scene3d>
-            <a:camera prst="orthographicFront">
-              <a:rot lat="0" lon="0" rev="0"/>
-            </a:camera>
-            <a:lightRig rig="threePt" dir="t">
-              <a:rot lat="0" lon="0" rev="1200000"/>
-            </a:lightRig>
-          </a:scene3d>
-          <a:sp3d>
-            <a:bevelT w="63500" h="25400"/>
-          </a:sp3d>
-        </a:effectStyle>
-      </a:effectStyleLst>
-      <a:bgFillStyleLst>
-        <a:solidFill>
-          <a:schemeClr val="phClr"/>
-        </a:solidFill>
-        <a:gradFill rotWithShape="1">
-          <a:gsLst>
-            <a:gs pos="0">
-              <a:schemeClr val="phClr">
-                <a:tint val="40000"/>
-                <a:satMod val="350000"/>
-              </a:schemeClr>
-            </a:gs>
-            <a:gs pos="40000">
-              <a:schemeClr val="phClr">
-                <a:tint val="45000"/>
-                <a:shade val="99000"/>
-                <a:satMod val="350000"/>
-              </a:schemeClr>
-            </a:gs>
-            <a:gs pos="100000">
-              <a:schemeClr val="phClr">
-                <a:shade val="20000"/>
-                <a:satMod val="255000"/>
-              </a:schemeClr>
-            </a:gs>
-          </a:gsLst>
-          <a:path path="circle">
-            <a:fillToRect l="50000" t="-80000" r="50000" b="180000"/>
-          </a:path>
-        </a:gradFill>
-        <a:gradFill rotWithShape="1">
-          <a:gsLst>
-            <a:gs pos="0">
-              <a:schemeClr val="phClr">
-                <a:tint val="80000"/>
-                <a:satMod val="300000"/>
-              </a:schemeClr>
-            </a:gs>
-            <a:gs pos="100000">
-              <a:schemeClr val="phClr">
-                <a:shade val="30000"/>
-                <a:satMod val="200000"/>
-              </a:schemeClr>
-            </a:gs>
-          </a:gsLst>
-          <a:path path="circle">
-            <a:fillToRect l="50000" t="50000" r="50000" b="50000"/>
-          </a:path>
-        </a:gradFill>
-      </a:bgFillStyleLst>
-    </a:fmtScheme>
-  </a:themeElements>
-</a:theme>
 </file>
</xml_diff>